<commit_message>
clean repository after paper acceptance
</commit_message>
<xml_diff>
--- a/manuscript/figures/pdb_depends_workflow_diagram.pptx
+++ b/manuscript/figures/pdb_depends_workflow_diagram.pptx
@@ -2,12 +2,12 @@
 <file path=ppt/presentation.xml><?xml version="1.0" encoding="utf-8"?>
 <p:presentation xmlns:a="http://schemas.openxmlformats.org/drawingml/2006/main" xmlns:r="http://schemas.openxmlformats.org/officeDocument/2006/relationships" xmlns:p="http://schemas.openxmlformats.org/presentationml/2006/main" saveSubsetFonts="1">
   <p:sldMasterIdLst>
-    <p:sldMasterId id="2147483672" r:id="rId1"/>
+    <p:sldMasterId id="2147483696" r:id="rId1"/>
   </p:sldMasterIdLst>
   <p:sldIdLst>
     <p:sldId id="257" r:id="rId2"/>
   </p:sldIdLst>
-  <p:sldSz cx="32918400" cy="14955838"/>
+  <p:sldSz cx="36576000" cy="18288000"/>
   <p:notesSz cx="6858000" cy="9144000"/>
   <p:defaultTextStyle>
     <a:defPPr>
@@ -141,15 +141,15 @@
         </p:nvSpPr>
         <p:spPr>
           <a:xfrm>
-            <a:off x="4114800" y="2447635"/>
-            <a:ext cx="24688800" cy="5206847"/>
+            <a:off x="4572000" y="2992968"/>
+            <a:ext cx="27432000" cy="6366933"/>
           </a:xfrm>
         </p:spPr>
         <p:txBody>
           <a:bodyPr anchor="b"/>
           <a:lstStyle>
             <a:lvl1pPr algn="ctr">
-              <a:defRPr sz="13085"/>
+              <a:defRPr sz="16000"/>
             </a:lvl1pPr>
           </a:lstStyle>
           <a:p>
@@ -173,8 +173,8 @@
         </p:nvSpPr>
         <p:spPr>
           <a:xfrm>
-            <a:off x="4114800" y="7855278"/>
-            <a:ext cx="24688800" cy="3610864"/>
+            <a:off x="4572000" y="9605435"/>
+            <a:ext cx="27432000" cy="4415365"/>
           </a:xfrm>
         </p:spPr>
         <p:txBody>
@@ -182,39 +182,39 @@
           <a:lstStyle>
             <a:lvl1pPr marL="0" indent="0" algn="ctr">
               <a:buNone/>
-              <a:defRPr sz="5234"/>
+              <a:defRPr sz="6400"/>
             </a:lvl1pPr>
-            <a:lvl2pPr marL="997062" indent="0" algn="ctr">
-              <a:buNone/>
-              <a:defRPr sz="4362"/>
+            <a:lvl2pPr marL="1219215" indent="0" algn="ctr">
+              <a:buNone/>
+              <a:defRPr sz="5333"/>
             </a:lvl2pPr>
-            <a:lvl3pPr marL="1994124" indent="0" algn="ctr">
-              <a:buNone/>
-              <a:defRPr sz="3925"/>
+            <a:lvl3pPr marL="2438430" indent="0" algn="ctr">
+              <a:buNone/>
+              <a:defRPr sz="4800"/>
             </a:lvl3pPr>
-            <a:lvl4pPr marL="2991185" indent="0" algn="ctr">
-              <a:buNone/>
-              <a:defRPr sz="3489"/>
+            <a:lvl4pPr marL="3657646" indent="0" algn="ctr">
+              <a:buNone/>
+              <a:defRPr sz="4267"/>
             </a:lvl4pPr>
-            <a:lvl5pPr marL="3988247" indent="0" algn="ctr">
-              <a:buNone/>
-              <a:defRPr sz="3489"/>
+            <a:lvl5pPr marL="4876861" indent="0" algn="ctr">
+              <a:buNone/>
+              <a:defRPr sz="4267"/>
             </a:lvl5pPr>
-            <a:lvl6pPr marL="4985309" indent="0" algn="ctr">
-              <a:buNone/>
-              <a:defRPr sz="3489"/>
+            <a:lvl6pPr marL="6096076" indent="0" algn="ctr">
+              <a:buNone/>
+              <a:defRPr sz="4267"/>
             </a:lvl6pPr>
-            <a:lvl7pPr marL="5982371" indent="0" algn="ctr">
-              <a:buNone/>
-              <a:defRPr sz="3489"/>
+            <a:lvl7pPr marL="7315291" indent="0" algn="ctr">
+              <a:buNone/>
+              <a:defRPr sz="4267"/>
             </a:lvl7pPr>
-            <a:lvl8pPr marL="6979432" indent="0" algn="ctr">
-              <a:buNone/>
-              <a:defRPr sz="3489"/>
+            <a:lvl8pPr marL="8534507" indent="0" algn="ctr">
+              <a:buNone/>
+              <a:defRPr sz="4267"/>
             </a:lvl8pPr>
-            <a:lvl9pPr marL="7976494" indent="0" algn="ctr">
-              <a:buNone/>
-              <a:defRPr sz="3489"/>
+            <a:lvl9pPr marL="9753722" indent="0" algn="ctr">
+              <a:buNone/>
+              <a:defRPr sz="4267"/>
             </a:lvl9pPr>
           </a:lstStyle>
           <a:p>
@@ -243,7 +243,7 @@
           <a:p>
             <a:fld id="{7628D374-B06C-4728-9C87-A440DBF4F285}" type="datetimeFigureOut">
               <a:rPr lang="en-US" smtClean="0"/>
-              <a:t>10/18/2021</a:t>
+              <a:t>4/29/2022</a:t>
             </a:fld>
             <a:endParaRPr lang="en-US"/>
           </a:p>
@@ -294,7 +294,7 @@
     </p:spTree>
     <p:extLst>
       <p:ext uri="{BB962C8B-B14F-4D97-AF65-F5344CB8AC3E}">
-        <p14:creationId xmlns:p14="http://schemas.microsoft.com/office/powerpoint/2010/main" val="465699818"/>
+        <p14:creationId xmlns:p14="http://schemas.microsoft.com/office/powerpoint/2010/main" val="2810014786"/>
       </p:ext>
     </p:extLst>
   </p:cSld>
@@ -413,7 +413,7 @@
           <a:p>
             <a:fld id="{7628D374-B06C-4728-9C87-A440DBF4F285}" type="datetimeFigureOut">
               <a:rPr lang="en-US" smtClean="0"/>
-              <a:t>10/18/2021</a:t>
+              <a:t>4/29/2022</a:t>
             </a:fld>
             <a:endParaRPr lang="en-US"/>
           </a:p>
@@ -464,7 +464,7 @@
     </p:spTree>
     <p:extLst>
       <p:ext uri="{BB962C8B-B14F-4D97-AF65-F5344CB8AC3E}">
-        <p14:creationId xmlns:p14="http://schemas.microsoft.com/office/powerpoint/2010/main" val="1972013059"/>
+        <p14:creationId xmlns:p14="http://schemas.microsoft.com/office/powerpoint/2010/main" val="3116391234"/>
       </p:ext>
     </p:extLst>
   </p:cSld>
@@ -503,8 +503,8 @@
         </p:nvSpPr>
         <p:spPr>
           <a:xfrm>
-            <a:off x="23557230" y="796260"/>
-            <a:ext cx="7098030" cy="12674381"/>
+            <a:off x="26174700" y="973667"/>
+            <a:ext cx="7886700" cy="15498235"/>
           </a:xfrm>
         </p:spPr>
         <p:txBody>
@@ -531,8 +531,8 @@
         </p:nvSpPr>
         <p:spPr>
           <a:xfrm>
-            <a:off x="2263140" y="796260"/>
-            <a:ext cx="20882610" cy="12674381"/>
+            <a:off x="2514600" y="973667"/>
+            <a:ext cx="23202900" cy="15498235"/>
           </a:xfrm>
         </p:spPr>
         <p:txBody>
@@ -593,7 +593,7 @@
           <a:p>
             <a:fld id="{7628D374-B06C-4728-9C87-A440DBF4F285}" type="datetimeFigureOut">
               <a:rPr lang="en-US" smtClean="0"/>
-              <a:t>10/18/2021</a:t>
+              <a:t>4/29/2022</a:t>
             </a:fld>
             <a:endParaRPr lang="en-US"/>
           </a:p>
@@ -644,7 +644,7 @@
     </p:spTree>
     <p:extLst>
       <p:ext uri="{BB962C8B-B14F-4D97-AF65-F5344CB8AC3E}">
-        <p14:creationId xmlns:p14="http://schemas.microsoft.com/office/powerpoint/2010/main" val="4166708660"/>
+        <p14:creationId xmlns:p14="http://schemas.microsoft.com/office/powerpoint/2010/main" val="1874781664"/>
       </p:ext>
     </p:extLst>
   </p:cSld>
@@ -763,7 +763,7 @@
           <a:p>
             <a:fld id="{7628D374-B06C-4728-9C87-A440DBF4F285}" type="datetimeFigureOut">
               <a:rPr lang="en-US" smtClean="0"/>
-              <a:t>10/18/2021</a:t>
+              <a:t>4/29/2022</a:t>
             </a:fld>
             <a:endParaRPr lang="en-US"/>
           </a:p>
@@ -814,7 +814,7 @@
     </p:spTree>
     <p:extLst>
       <p:ext uri="{BB962C8B-B14F-4D97-AF65-F5344CB8AC3E}">
-        <p14:creationId xmlns:p14="http://schemas.microsoft.com/office/powerpoint/2010/main" val="1765488679"/>
+        <p14:creationId xmlns:p14="http://schemas.microsoft.com/office/powerpoint/2010/main" val="3553199019"/>
       </p:ext>
     </p:extLst>
   </p:cSld>
@@ -853,15 +853,15 @@
         </p:nvSpPr>
         <p:spPr>
           <a:xfrm>
-            <a:off x="2245995" y="3728576"/>
-            <a:ext cx="28392120" cy="6221212"/>
+            <a:off x="2495550" y="4559303"/>
+            <a:ext cx="31546800" cy="7607299"/>
           </a:xfrm>
         </p:spPr>
         <p:txBody>
           <a:bodyPr anchor="b"/>
           <a:lstStyle>
             <a:lvl1pPr>
-              <a:defRPr sz="13085"/>
+              <a:defRPr sz="16000"/>
             </a:lvl1pPr>
           </a:lstStyle>
           <a:p>
@@ -885,8 +885,8 @@
         </p:nvSpPr>
         <p:spPr>
           <a:xfrm>
-            <a:off x="2245995" y="10008643"/>
-            <a:ext cx="28392120" cy="3271588"/>
+            <a:off x="2495550" y="12238569"/>
+            <a:ext cx="31546800" cy="4000499"/>
           </a:xfrm>
         </p:spPr>
         <p:txBody>
@@ -894,7 +894,7 @@
           <a:lstStyle>
             <a:lvl1pPr marL="0" indent="0">
               <a:buNone/>
-              <a:defRPr sz="5234">
+              <a:defRPr sz="6400">
                 <a:solidFill>
                   <a:schemeClr val="tx1">
                     <a:tint val="75000"/>
@@ -902,9 +902,9 @@
                 </a:solidFill>
               </a:defRPr>
             </a:lvl1pPr>
-            <a:lvl2pPr marL="997062" indent="0">
-              <a:buNone/>
-              <a:defRPr sz="4362">
+            <a:lvl2pPr marL="1219215" indent="0">
+              <a:buNone/>
+              <a:defRPr sz="5333">
                 <a:solidFill>
                   <a:schemeClr val="tx1">
                     <a:tint val="75000"/>
@@ -912,9 +912,9 @@
                 </a:solidFill>
               </a:defRPr>
             </a:lvl2pPr>
-            <a:lvl3pPr marL="1994124" indent="0">
-              <a:buNone/>
-              <a:defRPr sz="3925">
+            <a:lvl3pPr marL="2438430" indent="0">
+              <a:buNone/>
+              <a:defRPr sz="4800">
                 <a:solidFill>
                   <a:schemeClr val="tx1">
                     <a:tint val="75000"/>
@@ -922,9 +922,9 @@
                 </a:solidFill>
               </a:defRPr>
             </a:lvl3pPr>
-            <a:lvl4pPr marL="2991185" indent="0">
-              <a:buNone/>
-              <a:defRPr sz="3489">
+            <a:lvl4pPr marL="3657646" indent="0">
+              <a:buNone/>
+              <a:defRPr sz="4267">
                 <a:solidFill>
                   <a:schemeClr val="tx1">
                     <a:tint val="75000"/>
@@ -932,9 +932,9 @@
                 </a:solidFill>
               </a:defRPr>
             </a:lvl4pPr>
-            <a:lvl5pPr marL="3988247" indent="0">
-              <a:buNone/>
-              <a:defRPr sz="3489">
+            <a:lvl5pPr marL="4876861" indent="0">
+              <a:buNone/>
+              <a:defRPr sz="4267">
                 <a:solidFill>
                   <a:schemeClr val="tx1">
                     <a:tint val="75000"/>
@@ -942,9 +942,9 @@
                 </a:solidFill>
               </a:defRPr>
             </a:lvl5pPr>
-            <a:lvl6pPr marL="4985309" indent="0">
-              <a:buNone/>
-              <a:defRPr sz="3489">
+            <a:lvl6pPr marL="6096076" indent="0">
+              <a:buNone/>
+              <a:defRPr sz="4267">
                 <a:solidFill>
                   <a:schemeClr val="tx1">
                     <a:tint val="75000"/>
@@ -952,9 +952,9 @@
                 </a:solidFill>
               </a:defRPr>
             </a:lvl6pPr>
-            <a:lvl7pPr marL="5982371" indent="0">
-              <a:buNone/>
-              <a:defRPr sz="3489">
+            <a:lvl7pPr marL="7315291" indent="0">
+              <a:buNone/>
+              <a:defRPr sz="4267">
                 <a:solidFill>
                   <a:schemeClr val="tx1">
                     <a:tint val="75000"/>
@@ -962,9 +962,9 @@
                 </a:solidFill>
               </a:defRPr>
             </a:lvl7pPr>
-            <a:lvl8pPr marL="6979432" indent="0">
-              <a:buNone/>
-              <a:defRPr sz="3489">
+            <a:lvl8pPr marL="8534507" indent="0">
+              <a:buNone/>
+              <a:defRPr sz="4267">
                 <a:solidFill>
                   <a:schemeClr val="tx1">
                     <a:tint val="75000"/>
@@ -972,9 +972,9 @@
                 </a:solidFill>
               </a:defRPr>
             </a:lvl8pPr>
-            <a:lvl9pPr marL="7976494" indent="0">
-              <a:buNone/>
-              <a:defRPr sz="3489">
+            <a:lvl9pPr marL="9753722" indent="0">
+              <a:buNone/>
+              <a:defRPr sz="4267">
                 <a:solidFill>
                   <a:schemeClr val="tx1">
                     <a:tint val="75000"/>
@@ -1009,7 +1009,7 @@
           <a:p>
             <a:fld id="{7628D374-B06C-4728-9C87-A440DBF4F285}" type="datetimeFigureOut">
               <a:rPr lang="en-US" smtClean="0"/>
-              <a:t>10/18/2021</a:t>
+              <a:t>4/29/2022</a:t>
             </a:fld>
             <a:endParaRPr lang="en-US"/>
           </a:p>
@@ -1060,7 +1060,7 @@
     </p:spTree>
     <p:extLst>
       <p:ext uri="{BB962C8B-B14F-4D97-AF65-F5344CB8AC3E}">
-        <p14:creationId xmlns:p14="http://schemas.microsoft.com/office/powerpoint/2010/main" val="51350638"/>
+        <p14:creationId xmlns:p14="http://schemas.microsoft.com/office/powerpoint/2010/main" val="3135247441"/>
       </p:ext>
     </p:extLst>
   </p:cSld>
@@ -1122,8 +1122,8 @@
         </p:nvSpPr>
         <p:spPr>
           <a:xfrm>
-            <a:off x="2263140" y="3981299"/>
-            <a:ext cx="13990320" cy="9489342"/>
+            <a:off x="2514600" y="4868333"/>
+            <a:ext cx="15544800" cy="11603568"/>
           </a:xfrm>
         </p:spPr>
         <p:txBody>
@@ -1179,8 +1179,8 @@
         </p:nvSpPr>
         <p:spPr>
           <a:xfrm>
-            <a:off x="16664940" y="3981299"/>
-            <a:ext cx="13990320" cy="9489342"/>
+            <a:off x="18516600" y="4868333"/>
+            <a:ext cx="15544800" cy="11603568"/>
           </a:xfrm>
         </p:spPr>
         <p:txBody>
@@ -1241,7 +1241,7 @@
           <a:p>
             <a:fld id="{7628D374-B06C-4728-9C87-A440DBF4F285}" type="datetimeFigureOut">
               <a:rPr lang="en-US" smtClean="0"/>
-              <a:t>10/18/2021</a:t>
+              <a:t>4/29/2022</a:t>
             </a:fld>
             <a:endParaRPr lang="en-US"/>
           </a:p>
@@ -1292,7 +1292,7 @@
     </p:spTree>
     <p:extLst>
       <p:ext uri="{BB962C8B-B14F-4D97-AF65-F5344CB8AC3E}">
-        <p14:creationId xmlns:p14="http://schemas.microsoft.com/office/powerpoint/2010/main" val="453726676"/>
+        <p14:creationId xmlns:p14="http://schemas.microsoft.com/office/powerpoint/2010/main" val="3793831381"/>
       </p:ext>
     </p:extLst>
   </p:cSld>
@@ -1331,8 +1331,8 @@
         </p:nvSpPr>
         <p:spPr>
           <a:xfrm>
-            <a:off x="2267428" y="796261"/>
-            <a:ext cx="28392120" cy="2890771"/>
+            <a:off x="2519364" y="973668"/>
+            <a:ext cx="31546800" cy="3534835"/>
           </a:xfrm>
         </p:spPr>
         <p:txBody>
@@ -1359,8 +1359,8 @@
         </p:nvSpPr>
         <p:spPr>
           <a:xfrm>
-            <a:off x="2267429" y="3666258"/>
-            <a:ext cx="13926025" cy="1796777"/>
+            <a:off x="2519366" y="4483101"/>
+            <a:ext cx="15473361" cy="2197099"/>
           </a:xfrm>
         </p:spPr>
         <p:txBody>
@@ -1368,39 +1368,39 @@
           <a:lstStyle>
             <a:lvl1pPr marL="0" indent="0">
               <a:buNone/>
-              <a:defRPr sz="5234" b="1"/>
+              <a:defRPr sz="6400" b="1"/>
             </a:lvl1pPr>
-            <a:lvl2pPr marL="997062" indent="0">
-              <a:buNone/>
-              <a:defRPr sz="4362" b="1"/>
+            <a:lvl2pPr marL="1219215" indent="0">
+              <a:buNone/>
+              <a:defRPr sz="5333" b="1"/>
             </a:lvl2pPr>
-            <a:lvl3pPr marL="1994124" indent="0">
-              <a:buNone/>
-              <a:defRPr sz="3925" b="1"/>
+            <a:lvl3pPr marL="2438430" indent="0">
+              <a:buNone/>
+              <a:defRPr sz="4800" b="1"/>
             </a:lvl3pPr>
-            <a:lvl4pPr marL="2991185" indent="0">
-              <a:buNone/>
-              <a:defRPr sz="3489" b="1"/>
+            <a:lvl4pPr marL="3657646" indent="0">
+              <a:buNone/>
+              <a:defRPr sz="4267" b="1"/>
             </a:lvl4pPr>
-            <a:lvl5pPr marL="3988247" indent="0">
-              <a:buNone/>
-              <a:defRPr sz="3489" b="1"/>
+            <a:lvl5pPr marL="4876861" indent="0">
+              <a:buNone/>
+              <a:defRPr sz="4267" b="1"/>
             </a:lvl5pPr>
-            <a:lvl6pPr marL="4985309" indent="0">
-              <a:buNone/>
-              <a:defRPr sz="3489" b="1"/>
+            <a:lvl6pPr marL="6096076" indent="0">
+              <a:buNone/>
+              <a:defRPr sz="4267" b="1"/>
             </a:lvl6pPr>
-            <a:lvl7pPr marL="5982371" indent="0">
-              <a:buNone/>
-              <a:defRPr sz="3489" b="1"/>
+            <a:lvl7pPr marL="7315291" indent="0">
+              <a:buNone/>
+              <a:defRPr sz="4267" b="1"/>
             </a:lvl7pPr>
-            <a:lvl8pPr marL="6979432" indent="0">
-              <a:buNone/>
-              <a:defRPr sz="3489" b="1"/>
+            <a:lvl8pPr marL="8534507" indent="0">
+              <a:buNone/>
+              <a:defRPr sz="4267" b="1"/>
             </a:lvl8pPr>
-            <a:lvl9pPr marL="7976494" indent="0">
-              <a:buNone/>
-              <a:defRPr sz="3489" b="1"/>
+            <a:lvl9pPr marL="9753722" indent="0">
+              <a:buNone/>
+              <a:defRPr sz="4267" b="1"/>
             </a:lvl9pPr>
           </a:lstStyle>
           <a:p>
@@ -1424,8 +1424,8 @@
         </p:nvSpPr>
         <p:spPr>
           <a:xfrm>
-            <a:off x="2267429" y="5463035"/>
-            <a:ext cx="13926025" cy="8035302"/>
+            <a:off x="2519366" y="6680200"/>
+            <a:ext cx="15473361" cy="9825568"/>
           </a:xfrm>
         </p:spPr>
         <p:txBody>
@@ -1481,8 +1481,8 @@
         </p:nvSpPr>
         <p:spPr>
           <a:xfrm>
-            <a:off x="16664940" y="3666258"/>
-            <a:ext cx="13994608" cy="1796777"/>
+            <a:off x="18516600" y="4483101"/>
+            <a:ext cx="15549564" cy="2197099"/>
           </a:xfrm>
         </p:spPr>
         <p:txBody>
@@ -1490,39 +1490,39 @@
           <a:lstStyle>
             <a:lvl1pPr marL="0" indent="0">
               <a:buNone/>
-              <a:defRPr sz="5234" b="1"/>
+              <a:defRPr sz="6400" b="1"/>
             </a:lvl1pPr>
-            <a:lvl2pPr marL="997062" indent="0">
-              <a:buNone/>
-              <a:defRPr sz="4362" b="1"/>
+            <a:lvl2pPr marL="1219215" indent="0">
+              <a:buNone/>
+              <a:defRPr sz="5333" b="1"/>
             </a:lvl2pPr>
-            <a:lvl3pPr marL="1994124" indent="0">
-              <a:buNone/>
-              <a:defRPr sz="3925" b="1"/>
+            <a:lvl3pPr marL="2438430" indent="0">
+              <a:buNone/>
+              <a:defRPr sz="4800" b="1"/>
             </a:lvl3pPr>
-            <a:lvl4pPr marL="2991185" indent="0">
-              <a:buNone/>
-              <a:defRPr sz="3489" b="1"/>
+            <a:lvl4pPr marL="3657646" indent="0">
+              <a:buNone/>
+              <a:defRPr sz="4267" b="1"/>
             </a:lvl4pPr>
-            <a:lvl5pPr marL="3988247" indent="0">
-              <a:buNone/>
-              <a:defRPr sz="3489" b="1"/>
+            <a:lvl5pPr marL="4876861" indent="0">
+              <a:buNone/>
+              <a:defRPr sz="4267" b="1"/>
             </a:lvl5pPr>
-            <a:lvl6pPr marL="4985309" indent="0">
-              <a:buNone/>
-              <a:defRPr sz="3489" b="1"/>
+            <a:lvl6pPr marL="6096076" indent="0">
+              <a:buNone/>
+              <a:defRPr sz="4267" b="1"/>
             </a:lvl6pPr>
-            <a:lvl7pPr marL="5982371" indent="0">
-              <a:buNone/>
-              <a:defRPr sz="3489" b="1"/>
+            <a:lvl7pPr marL="7315291" indent="0">
+              <a:buNone/>
+              <a:defRPr sz="4267" b="1"/>
             </a:lvl7pPr>
-            <a:lvl8pPr marL="6979432" indent="0">
-              <a:buNone/>
-              <a:defRPr sz="3489" b="1"/>
+            <a:lvl8pPr marL="8534507" indent="0">
+              <a:buNone/>
+              <a:defRPr sz="4267" b="1"/>
             </a:lvl8pPr>
-            <a:lvl9pPr marL="7976494" indent="0">
-              <a:buNone/>
-              <a:defRPr sz="3489" b="1"/>
+            <a:lvl9pPr marL="9753722" indent="0">
+              <a:buNone/>
+              <a:defRPr sz="4267" b="1"/>
             </a:lvl9pPr>
           </a:lstStyle>
           <a:p>
@@ -1546,8 +1546,8 @@
         </p:nvSpPr>
         <p:spPr>
           <a:xfrm>
-            <a:off x="16664940" y="5463035"/>
-            <a:ext cx="13994608" cy="8035302"/>
+            <a:off x="18516600" y="6680200"/>
+            <a:ext cx="15549564" cy="9825568"/>
           </a:xfrm>
         </p:spPr>
         <p:txBody>
@@ -1608,7 +1608,7 @@
           <a:p>
             <a:fld id="{7628D374-B06C-4728-9C87-A440DBF4F285}" type="datetimeFigureOut">
               <a:rPr lang="en-US" smtClean="0"/>
-              <a:t>10/18/2021</a:t>
+              <a:t>4/29/2022</a:t>
             </a:fld>
             <a:endParaRPr lang="en-US"/>
           </a:p>
@@ -1659,7 +1659,7 @@
     </p:spTree>
     <p:extLst>
       <p:ext uri="{BB962C8B-B14F-4D97-AF65-F5344CB8AC3E}">
-        <p14:creationId xmlns:p14="http://schemas.microsoft.com/office/powerpoint/2010/main" val="3514125207"/>
+        <p14:creationId xmlns:p14="http://schemas.microsoft.com/office/powerpoint/2010/main" val="1196142343"/>
       </p:ext>
     </p:extLst>
   </p:cSld>
@@ -1726,7 +1726,7 @@
           <a:p>
             <a:fld id="{7628D374-B06C-4728-9C87-A440DBF4F285}" type="datetimeFigureOut">
               <a:rPr lang="en-US" smtClean="0"/>
-              <a:t>10/18/2021</a:t>
+              <a:t>4/29/2022</a:t>
             </a:fld>
             <a:endParaRPr lang="en-US"/>
           </a:p>
@@ -1777,7 +1777,7 @@
     </p:spTree>
     <p:extLst>
       <p:ext uri="{BB962C8B-B14F-4D97-AF65-F5344CB8AC3E}">
-        <p14:creationId xmlns:p14="http://schemas.microsoft.com/office/powerpoint/2010/main" val="2062069114"/>
+        <p14:creationId xmlns:p14="http://schemas.microsoft.com/office/powerpoint/2010/main" val="1376618645"/>
       </p:ext>
     </p:extLst>
   </p:cSld>
@@ -1821,7 +1821,7 @@
           <a:p>
             <a:fld id="{7628D374-B06C-4728-9C87-A440DBF4F285}" type="datetimeFigureOut">
               <a:rPr lang="en-US" smtClean="0"/>
-              <a:t>10/18/2021</a:t>
+              <a:t>4/29/2022</a:t>
             </a:fld>
             <a:endParaRPr lang="en-US"/>
           </a:p>
@@ -1872,7 +1872,7 @@
     </p:spTree>
     <p:extLst>
       <p:ext uri="{BB962C8B-B14F-4D97-AF65-F5344CB8AC3E}">
-        <p14:creationId xmlns:p14="http://schemas.microsoft.com/office/powerpoint/2010/main" val="809783354"/>
+        <p14:creationId xmlns:p14="http://schemas.microsoft.com/office/powerpoint/2010/main" val="1582982910"/>
       </p:ext>
     </p:extLst>
   </p:cSld>
@@ -1911,15 +1911,15 @@
         </p:nvSpPr>
         <p:spPr>
           <a:xfrm>
-            <a:off x="2267429" y="997056"/>
-            <a:ext cx="10617040" cy="3489696"/>
+            <a:off x="2519366" y="1219200"/>
+            <a:ext cx="11796711" cy="4267200"/>
           </a:xfrm>
         </p:spPr>
         <p:txBody>
           <a:bodyPr anchor="b"/>
           <a:lstStyle>
             <a:lvl1pPr>
-              <a:defRPr sz="6979"/>
+              <a:defRPr sz="8533"/>
             </a:lvl1pPr>
           </a:lstStyle>
           <a:p>
@@ -1943,39 +1943,39 @@
         </p:nvSpPr>
         <p:spPr>
           <a:xfrm>
-            <a:off x="13994608" y="2153365"/>
-            <a:ext cx="16664940" cy="10628339"/>
+            <a:off x="15549564" y="2633135"/>
+            <a:ext cx="18516600" cy="12996333"/>
           </a:xfrm>
         </p:spPr>
         <p:txBody>
           <a:bodyPr/>
           <a:lstStyle>
             <a:lvl1pPr>
-              <a:defRPr sz="6979"/>
+              <a:defRPr sz="8533"/>
             </a:lvl1pPr>
             <a:lvl2pPr>
-              <a:defRPr sz="6106"/>
+              <a:defRPr sz="7467"/>
             </a:lvl2pPr>
             <a:lvl3pPr>
-              <a:defRPr sz="5234"/>
+              <a:defRPr sz="6400"/>
             </a:lvl3pPr>
             <a:lvl4pPr>
-              <a:defRPr sz="4362"/>
+              <a:defRPr sz="5333"/>
             </a:lvl4pPr>
             <a:lvl5pPr>
-              <a:defRPr sz="4362"/>
+              <a:defRPr sz="5333"/>
             </a:lvl5pPr>
             <a:lvl6pPr>
-              <a:defRPr sz="4362"/>
+              <a:defRPr sz="5333"/>
             </a:lvl6pPr>
             <a:lvl7pPr>
-              <a:defRPr sz="4362"/>
+              <a:defRPr sz="5333"/>
             </a:lvl7pPr>
             <a:lvl8pPr>
-              <a:defRPr sz="4362"/>
+              <a:defRPr sz="5333"/>
             </a:lvl8pPr>
             <a:lvl9pPr>
-              <a:defRPr sz="4362"/>
+              <a:defRPr sz="5333"/>
             </a:lvl9pPr>
           </a:lstStyle>
           <a:p>
@@ -2028,8 +2028,8 @@
         </p:nvSpPr>
         <p:spPr>
           <a:xfrm>
-            <a:off x="2267429" y="4486751"/>
-            <a:ext cx="10617040" cy="8312262"/>
+            <a:off x="2519366" y="5486400"/>
+            <a:ext cx="11796711" cy="10164235"/>
           </a:xfrm>
         </p:spPr>
         <p:txBody>
@@ -2037,39 +2037,39 @@
           <a:lstStyle>
             <a:lvl1pPr marL="0" indent="0">
               <a:buNone/>
-              <a:defRPr sz="3489"/>
+              <a:defRPr sz="4267"/>
             </a:lvl1pPr>
-            <a:lvl2pPr marL="997062" indent="0">
-              <a:buNone/>
-              <a:defRPr sz="3053"/>
+            <a:lvl2pPr marL="1219215" indent="0">
+              <a:buNone/>
+              <a:defRPr sz="3733"/>
             </a:lvl2pPr>
-            <a:lvl3pPr marL="1994124" indent="0">
-              <a:buNone/>
-              <a:defRPr sz="2617"/>
+            <a:lvl3pPr marL="2438430" indent="0">
+              <a:buNone/>
+              <a:defRPr sz="3200"/>
             </a:lvl3pPr>
-            <a:lvl4pPr marL="2991185" indent="0">
-              <a:buNone/>
-              <a:defRPr sz="2181"/>
+            <a:lvl4pPr marL="3657646" indent="0">
+              <a:buNone/>
+              <a:defRPr sz="2667"/>
             </a:lvl4pPr>
-            <a:lvl5pPr marL="3988247" indent="0">
-              <a:buNone/>
-              <a:defRPr sz="2181"/>
+            <a:lvl5pPr marL="4876861" indent="0">
+              <a:buNone/>
+              <a:defRPr sz="2667"/>
             </a:lvl5pPr>
-            <a:lvl6pPr marL="4985309" indent="0">
-              <a:buNone/>
-              <a:defRPr sz="2181"/>
+            <a:lvl6pPr marL="6096076" indent="0">
+              <a:buNone/>
+              <a:defRPr sz="2667"/>
             </a:lvl6pPr>
-            <a:lvl7pPr marL="5982371" indent="0">
-              <a:buNone/>
-              <a:defRPr sz="2181"/>
+            <a:lvl7pPr marL="7315291" indent="0">
+              <a:buNone/>
+              <a:defRPr sz="2667"/>
             </a:lvl7pPr>
-            <a:lvl8pPr marL="6979432" indent="0">
-              <a:buNone/>
-              <a:defRPr sz="2181"/>
+            <a:lvl8pPr marL="8534507" indent="0">
+              <a:buNone/>
+              <a:defRPr sz="2667"/>
             </a:lvl8pPr>
-            <a:lvl9pPr marL="7976494" indent="0">
-              <a:buNone/>
-              <a:defRPr sz="2181"/>
+            <a:lvl9pPr marL="9753722" indent="0">
+              <a:buNone/>
+              <a:defRPr sz="2667"/>
             </a:lvl9pPr>
           </a:lstStyle>
           <a:p>
@@ -2098,7 +2098,7 @@
           <a:p>
             <a:fld id="{7628D374-B06C-4728-9C87-A440DBF4F285}" type="datetimeFigureOut">
               <a:rPr lang="en-US" smtClean="0"/>
-              <a:t>10/18/2021</a:t>
+              <a:t>4/29/2022</a:t>
             </a:fld>
             <a:endParaRPr lang="en-US"/>
           </a:p>
@@ -2149,7 +2149,7 @@
     </p:spTree>
     <p:extLst>
       <p:ext uri="{BB962C8B-B14F-4D97-AF65-F5344CB8AC3E}">
-        <p14:creationId xmlns:p14="http://schemas.microsoft.com/office/powerpoint/2010/main" val="3555794532"/>
+        <p14:creationId xmlns:p14="http://schemas.microsoft.com/office/powerpoint/2010/main" val="3277859185"/>
       </p:ext>
     </p:extLst>
   </p:cSld>
@@ -2188,15 +2188,15 @@
         </p:nvSpPr>
         <p:spPr>
           <a:xfrm>
-            <a:off x="2267429" y="997056"/>
-            <a:ext cx="10617040" cy="3489696"/>
+            <a:off x="2519366" y="1219200"/>
+            <a:ext cx="11796711" cy="4267200"/>
           </a:xfrm>
         </p:spPr>
         <p:txBody>
           <a:bodyPr anchor="b"/>
           <a:lstStyle>
             <a:lvl1pPr>
-              <a:defRPr sz="6979"/>
+              <a:defRPr sz="8533"/>
             </a:lvl1pPr>
           </a:lstStyle>
           <a:p>
@@ -2220,8 +2220,8 @@
         </p:nvSpPr>
         <p:spPr>
           <a:xfrm>
-            <a:off x="13994608" y="2153365"/>
-            <a:ext cx="16664940" cy="10628339"/>
+            <a:off x="15549564" y="2633135"/>
+            <a:ext cx="18516600" cy="12996333"/>
           </a:xfrm>
         </p:spPr>
         <p:txBody>
@@ -2229,39 +2229,39 @@
           <a:lstStyle>
             <a:lvl1pPr marL="0" indent="0">
               <a:buNone/>
-              <a:defRPr sz="6979"/>
+              <a:defRPr sz="8533"/>
             </a:lvl1pPr>
-            <a:lvl2pPr marL="997062" indent="0">
-              <a:buNone/>
-              <a:defRPr sz="6106"/>
+            <a:lvl2pPr marL="1219215" indent="0">
+              <a:buNone/>
+              <a:defRPr sz="7467"/>
             </a:lvl2pPr>
-            <a:lvl3pPr marL="1994124" indent="0">
-              <a:buNone/>
-              <a:defRPr sz="5234"/>
+            <a:lvl3pPr marL="2438430" indent="0">
+              <a:buNone/>
+              <a:defRPr sz="6400"/>
             </a:lvl3pPr>
-            <a:lvl4pPr marL="2991185" indent="0">
-              <a:buNone/>
-              <a:defRPr sz="4362"/>
+            <a:lvl4pPr marL="3657646" indent="0">
+              <a:buNone/>
+              <a:defRPr sz="5333"/>
             </a:lvl4pPr>
-            <a:lvl5pPr marL="3988247" indent="0">
-              <a:buNone/>
-              <a:defRPr sz="4362"/>
+            <a:lvl5pPr marL="4876861" indent="0">
+              <a:buNone/>
+              <a:defRPr sz="5333"/>
             </a:lvl5pPr>
-            <a:lvl6pPr marL="4985309" indent="0">
-              <a:buNone/>
-              <a:defRPr sz="4362"/>
+            <a:lvl6pPr marL="6096076" indent="0">
+              <a:buNone/>
+              <a:defRPr sz="5333"/>
             </a:lvl6pPr>
-            <a:lvl7pPr marL="5982371" indent="0">
-              <a:buNone/>
-              <a:defRPr sz="4362"/>
+            <a:lvl7pPr marL="7315291" indent="0">
+              <a:buNone/>
+              <a:defRPr sz="5333"/>
             </a:lvl7pPr>
-            <a:lvl8pPr marL="6979432" indent="0">
-              <a:buNone/>
-              <a:defRPr sz="4362"/>
+            <a:lvl8pPr marL="8534507" indent="0">
+              <a:buNone/>
+              <a:defRPr sz="5333"/>
             </a:lvl8pPr>
-            <a:lvl9pPr marL="7976494" indent="0">
-              <a:buNone/>
-              <a:defRPr sz="4362"/>
+            <a:lvl9pPr marL="9753722" indent="0">
+              <a:buNone/>
+              <a:defRPr sz="5333"/>
             </a:lvl9pPr>
           </a:lstStyle>
           <a:p>
@@ -2285,8 +2285,8 @@
         </p:nvSpPr>
         <p:spPr>
           <a:xfrm>
-            <a:off x="2267429" y="4486751"/>
-            <a:ext cx="10617040" cy="8312262"/>
+            <a:off x="2519366" y="5486400"/>
+            <a:ext cx="11796711" cy="10164235"/>
           </a:xfrm>
         </p:spPr>
         <p:txBody>
@@ -2294,39 +2294,39 @@
           <a:lstStyle>
             <a:lvl1pPr marL="0" indent="0">
               <a:buNone/>
-              <a:defRPr sz="3489"/>
+              <a:defRPr sz="4267"/>
             </a:lvl1pPr>
-            <a:lvl2pPr marL="997062" indent="0">
-              <a:buNone/>
-              <a:defRPr sz="3053"/>
+            <a:lvl2pPr marL="1219215" indent="0">
+              <a:buNone/>
+              <a:defRPr sz="3733"/>
             </a:lvl2pPr>
-            <a:lvl3pPr marL="1994124" indent="0">
-              <a:buNone/>
-              <a:defRPr sz="2617"/>
+            <a:lvl3pPr marL="2438430" indent="0">
+              <a:buNone/>
+              <a:defRPr sz="3200"/>
             </a:lvl3pPr>
-            <a:lvl4pPr marL="2991185" indent="0">
-              <a:buNone/>
-              <a:defRPr sz="2181"/>
+            <a:lvl4pPr marL="3657646" indent="0">
+              <a:buNone/>
+              <a:defRPr sz="2667"/>
             </a:lvl4pPr>
-            <a:lvl5pPr marL="3988247" indent="0">
-              <a:buNone/>
-              <a:defRPr sz="2181"/>
+            <a:lvl5pPr marL="4876861" indent="0">
+              <a:buNone/>
+              <a:defRPr sz="2667"/>
             </a:lvl5pPr>
-            <a:lvl6pPr marL="4985309" indent="0">
-              <a:buNone/>
-              <a:defRPr sz="2181"/>
+            <a:lvl6pPr marL="6096076" indent="0">
+              <a:buNone/>
+              <a:defRPr sz="2667"/>
             </a:lvl6pPr>
-            <a:lvl7pPr marL="5982371" indent="0">
-              <a:buNone/>
-              <a:defRPr sz="2181"/>
+            <a:lvl7pPr marL="7315291" indent="0">
+              <a:buNone/>
+              <a:defRPr sz="2667"/>
             </a:lvl7pPr>
-            <a:lvl8pPr marL="6979432" indent="0">
-              <a:buNone/>
-              <a:defRPr sz="2181"/>
+            <a:lvl8pPr marL="8534507" indent="0">
+              <a:buNone/>
+              <a:defRPr sz="2667"/>
             </a:lvl8pPr>
-            <a:lvl9pPr marL="7976494" indent="0">
-              <a:buNone/>
-              <a:defRPr sz="2181"/>
+            <a:lvl9pPr marL="9753722" indent="0">
+              <a:buNone/>
+              <a:defRPr sz="2667"/>
             </a:lvl9pPr>
           </a:lstStyle>
           <a:p>
@@ -2355,7 +2355,7 @@
           <a:p>
             <a:fld id="{7628D374-B06C-4728-9C87-A440DBF4F285}" type="datetimeFigureOut">
               <a:rPr lang="en-US" smtClean="0"/>
-              <a:t>10/18/2021</a:t>
+              <a:t>4/29/2022</a:t>
             </a:fld>
             <a:endParaRPr lang="en-US"/>
           </a:p>
@@ -2406,7 +2406,7 @@
     </p:spTree>
     <p:extLst>
       <p:ext uri="{BB962C8B-B14F-4D97-AF65-F5344CB8AC3E}">
-        <p14:creationId xmlns:p14="http://schemas.microsoft.com/office/powerpoint/2010/main" val="3812341105"/>
+        <p14:creationId xmlns:p14="http://schemas.microsoft.com/office/powerpoint/2010/main" val="2837214620"/>
       </p:ext>
     </p:extLst>
   </p:cSld>
@@ -2450,8 +2450,8 @@
         </p:nvSpPr>
         <p:spPr>
           <a:xfrm>
-            <a:off x="2263140" y="796261"/>
-            <a:ext cx="28392120" cy="2890771"/>
+            <a:off x="2514600" y="973668"/>
+            <a:ext cx="31546800" cy="3534835"/>
           </a:xfrm>
           <a:prstGeom prst="rect">
             <a:avLst/>
@@ -2483,8 +2483,8 @@
         </p:nvSpPr>
         <p:spPr>
           <a:xfrm>
-            <a:off x="2263140" y="3981299"/>
-            <a:ext cx="28392120" cy="9489342"/>
+            <a:off x="2514600" y="4868333"/>
+            <a:ext cx="31546800" cy="11603568"/>
           </a:xfrm>
           <a:prstGeom prst="rect">
             <a:avLst/>
@@ -2545,8 +2545,8 @@
         </p:nvSpPr>
         <p:spPr>
           <a:xfrm>
-            <a:off x="2263140" y="13861847"/>
-            <a:ext cx="7406640" cy="796260"/>
+            <a:off x="2514600" y="16950268"/>
+            <a:ext cx="8229600" cy="973667"/>
           </a:xfrm>
           <a:prstGeom prst="rect">
             <a:avLst/>
@@ -2556,7 +2556,7 @@
           <a:bodyPr vert="horz" lIns="91440" tIns="45720" rIns="91440" bIns="45720" rtlCol="0" anchor="ctr"/>
           <a:lstStyle>
             <a:lvl1pPr algn="l">
-              <a:defRPr sz="2617">
+              <a:defRPr sz="3200">
                 <a:solidFill>
                   <a:schemeClr val="tx1">
                     <a:tint val="75000"/>
@@ -2568,7 +2568,7 @@
           <a:p>
             <a:fld id="{7628D374-B06C-4728-9C87-A440DBF4F285}" type="datetimeFigureOut">
               <a:rPr lang="en-US" smtClean="0"/>
-              <a:t>10/18/2021</a:t>
+              <a:t>4/29/2022</a:t>
             </a:fld>
             <a:endParaRPr lang="en-US"/>
           </a:p>
@@ -2586,8 +2586,8 @@
         </p:nvSpPr>
         <p:spPr>
           <a:xfrm>
-            <a:off x="10904220" y="13861847"/>
-            <a:ext cx="11109960" cy="796260"/>
+            <a:off x="12115800" y="16950268"/>
+            <a:ext cx="12344400" cy="973667"/>
           </a:xfrm>
           <a:prstGeom prst="rect">
             <a:avLst/>
@@ -2597,7 +2597,7 @@
           <a:bodyPr vert="horz" lIns="91440" tIns="45720" rIns="91440" bIns="45720" rtlCol="0" anchor="ctr"/>
           <a:lstStyle>
             <a:lvl1pPr algn="ctr">
-              <a:defRPr sz="2617">
+              <a:defRPr sz="3200">
                 <a:solidFill>
                   <a:schemeClr val="tx1">
                     <a:tint val="75000"/>
@@ -2623,8 +2623,8 @@
         </p:nvSpPr>
         <p:spPr>
           <a:xfrm>
-            <a:off x="23248620" y="13861847"/>
-            <a:ext cx="7406640" cy="796260"/>
+            <a:off x="25831800" y="16950268"/>
+            <a:ext cx="8229600" cy="973667"/>
           </a:xfrm>
           <a:prstGeom prst="rect">
             <a:avLst/>
@@ -2634,7 +2634,7 @@
           <a:bodyPr vert="horz" lIns="91440" tIns="45720" rIns="91440" bIns="45720" rtlCol="0" anchor="ctr"/>
           <a:lstStyle>
             <a:lvl1pPr algn="r">
-              <a:defRPr sz="2617">
+              <a:defRPr sz="3200">
                 <a:solidFill>
                   <a:schemeClr val="tx1">
                     <a:tint val="75000"/>
@@ -2655,27 +2655,27 @@
     </p:spTree>
     <p:extLst>
       <p:ext uri="{BB962C8B-B14F-4D97-AF65-F5344CB8AC3E}">
-        <p14:creationId xmlns:p14="http://schemas.microsoft.com/office/powerpoint/2010/main" val="1449862858"/>
+        <p14:creationId xmlns:p14="http://schemas.microsoft.com/office/powerpoint/2010/main" val="1355000909"/>
       </p:ext>
     </p:extLst>
   </p:cSld>
   <p:clrMap bg1="lt1" tx1="dk1" bg2="lt2" tx2="dk2" accent1="accent1" accent2="accent2" accent3="accent3" accent4="accent4" accent5="accent5" accent6="accent6" hlink="hlink" folHlink="folHlink"/>
   <p:sldLayoutIdLst>
-    <p:sldLayoutId id="2147483673" r:id="rId1"/>
-    <p:sldLayoutId id="2147483674" r:id="rId2"/>
-    <p:sldLayoutId id="2147483675" r:id="rId3"/>
-    <p:sldLayoutId id="2147483676" r:id="rId4"/>
-    <p:sldLayoutId id="2147483677" r:id="rId5"/>
-    <p:sldLayoutId id="2147483678" r:id="rId6"/>
-    <p:sldLayoutId id="2147483679" r:id="rId7"/>
-    <p:sldLayoutId id="2147483680" r:id="rId8"/>
-    <p:sldLayoutId id="2147483681" r:id="rId9"/>
-    <p:sldLayoutId id="2147483682" r:id="rId10"/>
-    <p:sldLayoutId id="2147483683" r:id="rId11"/>
+    <p:sldLayoutId id="2147483697" r:id="rId1"/>
+    <p:sldLayoutId id="2147483698" r:id="rId2"/>
+    <p:sldLayoutId id="2147483699" r:id="rId3"/>
+    <p:sldLayoutId id="2147483700" r:id="rId4"/>
+    <p:sldLayoutId id="2147483701" r:id="rId5"/>
+    <p:sldLayoutId id="2147483702" r:id="rId6"/>
+    <p:sldLayoutId id="2147483703" r:id="rId7"/>
+    <p:sldLayoutId id="2147483704" r:id="rId8"/>
+    <p:sldLayoutId id="2147483705" r:id="rId9"/>
+    <p:sldLayoutId id="2147483706" r:id="rId10"/>
+    <p:sldLayoutId id="2147483707" r:id="rId11"/>
   </p:sldLayoutIdLst>
   <p:txStyles>
     <p:titleStyle>
-      <a:lvl1pPr algn="l" defTabSz="1994124" rtl="0" eaLnBrk="1" latinLnBrk="0" hangingPunct="1">
+      <a:lvl1pPr algn="l" defTabSz="2438430" rtl="0" eaLnBrk="1" latinLnBrk="0" hangingPunct="1">
         <a:lnSpc>
           <a:spcPct val="90000"/>
         </a:lnSpc>
@@ -2683,7 +2683,7 @@
           <a:spcPct val="0"/>
         </a:spcBef>
         <a:buNone/>
-        <a:defRPr sz="9596" kern="1200">
+        <a:defRPr sz="11733" kern="1200">
           <a:solidFill>
             <a:schemeClr val="tx1"/>
           </a:solidFill>
@@ -2694,16 +2694,16 @@
       </a:lvl1pPr>
     </p:titleStyle>
     <p:bodyStyle>
-      <a:lvl1pPr marL="498531" indent="-498531" algn="l" defTabSz="1994124" rtl="0" eaLnBrk="1" latinLnBrk="0" hangingPunct="1">
+      <a:lvl1pPr marL="609608" indent="-609608" algn="l" defTabSz="2438430" rtl="0" eaLnBrk="1" latinLnBrk="0" hangingPunct="1">
         <a:lnSpc>
           <a:spcPct val="90000"/>
         </a:lnSpc>
         <a:spcBef>
-          <a:spcPts val="2181"/>
+          <a:spcPts val="2667"/>
         </a:spcBef>
         <a:buFont typeface="Arial" panose="020B0604020202020204" pitchFamily="34" charset="0"/>
         <a:buChar char="•"/>
-        <a:defRPr sz="6106" kern="1200">
+        <a:defRPr sz="7467" kern="1200">
           <a:solidFill>
             <a:schemeClr val="tx1"/>
           </a:solidFill>
@@ -2712,16 +2712,16 @@
           <a:cs typeface="+mn-cs"/>
         </a:defRPr>
       </a:lvl1pPr>
-      <a:lvl2pPr marL="1495593" indent="-498531" algn="l" defTabSz="1994124" rtl="0" eaLnBrk="1" latinLnBrk="0" hangingPunct="1">
+      <a:lvl2pPr marL="1828823" indent="-609608" algn="l" defTabSz="2438430" rtl="0" eaLnBrk="1" latinLnBrk="0" hangingPunct="1">
         <a:lnSpc>
           <a:spcPct val="90000"/>
         </a:lnSpc>
         <a:spcBef>
-          <a:spcPts val="1090"/>
+          <a:spcPts val="1333"/>
         </a:spcBef>
         <a:buFont typeface="Arial" panose="020B0604020202020204" pitchFamily="34" charset="0"/>
         <a:buChar char="•"/>
-        <a:defRPr sz="5234" kern="1200">
+        <a:defRPr sz="6400" kern="1200">
           <a:solidFill>
             <a:schemeClr val="tx1"/>
           </a:solidFill>
@@ -2730,16 +2730,16 @@
           <a:cs typeface="+mn-cs"/>
         </a:defRPr>
       </a:lvl2pPr>
-      <a:lvl3pPr marL="2492654" indent="-498531" algn="l" defTabSz="1994124" rtl="0" eaLnBrk="1" latinLnBrk="0" hangingPunct="1">
+      <a:lvl3pPr marL="3048038" indent="-609608" algn="l" defTabSz="2438430" rtl="0" eaLnBrk="1" latinLnBrk="0" hangingPunct="1">
         <a:lnSpc>
           <a:spcPct val="90000"/>
         </a:lnSpc>
         <a:spcBef>
-          <a:spcPts val="1090"/>
+          <a:spcPts val="1333"/>
         </a:spcBef>
         <a:buFont typeface="Arial" panose="020B0604020202020204" pitchFamily="34" charset="0"/>
         <a:buChar char="•"/>
-        <a:defRPr sz="4362" kern="1200">
+        <a:defRPr sz="5333" kern="1200">
           <a:solidFill>
             <a:schemeClr val="tx1"/>
           </a:solidFill>
@@ -2748,16 +2748,16 @@
           <a:cs typeface="+mn-cs"/>
         </a:defRPr>
       </a:lvl3pPr>
-      <a:lvl4pPr marL="3489716" indent="-498531" algn="l" defTabSz="1994124" rtl="0" eaLnBrk="1" latinLnBrk="0" hangingPunct="1">
+      <a:lvl4pPr marL="4267253" indent="-609608" algn="l" defTabSz="2438430" rtl="0" eaLnBrk="1" latinLnBrk="0" hangingPunct="1">
         <a:lnSpc>
           <a:spcPct val="90000"/>
         </a:lnSpc>
         <a:spcBef>
-          <a:spcPts val="1090"/>
+          <a:spcPts val="1333"/>
         </a:spcBef>
         <a:buFont typeface="Arial" panose="020B0604020202020204" pitchFamily="34" charset="0"/>
         <a:buChar char="•"/>
-        <a:defRPr sz="3925" kern="1200">
+        <a:defRPr sz="4800" kern="1200">
           <a:solidFill>
             <a:schemeClr val="tx1"/>
           </a:solidFill>
@@ -2766,16 +2766,16 @@
           <a:cs typeface="+mn-cs"/>
         </a:defRPr>
       </a:lvl4pPr>
-      <a:lvl5pPr marL="4486778" indent="-498531" algn="l" defTabSz="1994124" rtl="0" eaLnBrk="1" latinLnBrk="0" hangingPunct="1">
+      <a:lvl5pPr marL="5486469" indent="-609608" algn="l" defTabSz="2438430" rtl="0" eaLnBrk="1" latinLnBrk="0" hangingPunct="1">
         <a:lnSpc>
           <a:spcPct val="90000"/>
         </a:lnSpc>
         <a:spcBef>
-          <a:spcPts val="1090"/>
+          <a:spcPts val="1333"/>
         </a:spcBef>
         <a:buFont typeface="Arial" panose="020B0604020202020204" pitchFamily="34" charset="0"/>
         <a:buChar char="•"/>
-        <a:defRPr sz="3925" kern="1200">
+        <a:defRPr sz="4800" kern="1200">
           <a:solidFill>
             <a:schemeClr val="tx1"/>
           </a:solidFill>
@@ -2784,16 +2784,16 @@
           <a:cs typeface="+mn-cs"/>
         </a:defRPr>
       </a:lvl5pPr>
-      <a:lvl6pPr marL="5483840" indent="-498531" algn="l" defTabSz="1994124" rtl="0" eaLnBrk="1" latinLnBrk="0" hangingPunct="1">
+      <a:lvl6pPr marL="6705684" indent="-609608" algn="l" defTabSz="2438430" rtl="0" eaLnBrk="1" latinLnBrk="0" hangingPunct="1">
         <a:lnSpc>
           <a:spcPct val="90000"/>
         </a:lnSpc>
         <a:spcBef>
-          <a:spcPts val="1090"/>
+          <a:spcPts val="1333"/>
         </a:spcBef>
         <a:buFont typeface="Arial" panose="020B0604020202020204" pitchFamily="34" charset="0"/>
         <a:buChar char="•"/>
-        <a:defRPr sz="3925" kern="1200">
+        <a:defRPr sz="4800" kern="1200">
           <a:solidFill>
             <a:schemeClr val="tx1"/>
           </a:solidFill>
@@ -2802,16 +2802,16 @@
           <a:cs typeface="+mn-cs"/>
         </a:defRPr>
       </a:lvl6pPr>
-      <a:lvl7pPr marL="6480901" indent="-498531" algn="l" defTabSz="1994124" rtl="0" eaLnBrk="1" latinLnBrk="0" hangingPunct="1">
+      <a:lvl7pPr marL="7924899" indent="-609608" algn="l" defTabSz="2438430" rtl="0" eaLnBrk="1" latinLnBrk="0" hangingPunct="1">
         <a:lnSpc>
           <a:spcPct val="90000"/>
         </a:lnSpc>
         <a:spcBef>
-          <a:spcPts val="1090"/>
+          <a:spcPts val="1333"/>
         </a:spcBef>
         <a:buFont typeface="Arial" panose="020B0604020202020204" pitchFamily="34" charset="0"/>
         <a:buChar char="•"/>
-        <a:defRPr sz="3925" kern="1200">
+        <a:defRPr sz="4800" kern="1200">
           <a:solidFill>
             <a:schemeClr val="tx1"/>
           </a:solidFill>
@@ -2820,16 +2820,16 @@
           <a:cs typeface="+mn-cs"/>
         </a:defRPr>
       </a:lvl7pPr>
-      <a:lvl8pPr marL="7477963" indent="-498531" algn="l" defTabSz="1994124" rtl="0" eaLnBrk="1" latinLnBrk="0" hangingPunct="1">
+      <a:lvl8pPr marL="9144114" indent="-609608" algn="l" defTabSz="2438430" rtl="0" eaLnBrk="1" latinLnBrk="0" hangingPunct="1">
         <a:lnSpc>
           <a:spcPct val="90000"/>
         </a:lnSpc>
         <a:spcBef>
-          <a:spcPts val="1090"/>
+          <a:spcPts val="1333"/>
         </a:spcBef>
         <a:buFont typeface="Arial" panose="020B0604020202020204" pitchFamily="34" charset="0"/>
         <a:buChar char="•"/>
-        <a:defRPr sz="3925" kern="1200">
+        <a:defRPr sz="4800" kern="1200">
           <a:solidFill>
             <a:schemeClr val="tx1"/>
           </a:solidFill>
@@ -2838,16 +2838,16 @@
           <a:cs typeface="+mn-cs"/>
         </a:defRPr>
       </a:lvl8pPr>
-      <a:lvl9pPr marL="8475025" indent="-498531" algn="l" defTabSz="1994124" rtl="0" eaLnBrk="1" latinLnBrk="0" hangingPunct="1">
+      <a:lvl9pPr marL="10363330" indent="-609608" algn="l" defTabSz="2438430" rtl="0" eaLnBrk="1" latinLnBrk="0" hangingPunct="1">
         <a:lnSpc>
           <a:spcPct val="90000"/>
         </a:lnSpc>
         <a:spcBef>
-          <a:spcPts val="1090"/>
+          <a:spcPts val="1333"/>
         </a:spcBef>
         <a:buFont typeface="Arial" panose="020B0604020202020204" pitchFamily="34" charset="0"/>
         <a:buChar char="•"/>
-        <a:defRPr sz="3925" kern="1200">
+        <a:defRPr sz="4800" kern="1200">
           <a:solidFill>
             <a:schemeClr val="tx1"/>
           </a:solidFill>
@@ -2861,8 +2861,8 @@
       <a:defPPr>
         <a:defRPr lang="en-US"/>
       </a:defPPr>
-      <a:lvl1pPr marL="0" algn="l" defTabSz="1994124" rtl="0" eaLnBrk="1" latinLnBrk="0" hangingPunct="1">
-        <a:defRPr sz="3925" kern="1200">
+      <a:lvl1pPr marL="0" algn="l" defTabSz="2438430" rtl="0" eaLnBrk="1" latinLnBrk="0" hangingPunct="1">
+        <a:defRPr sz="4800" kern="1200">
           <a:solidFill>
             <a:schemeClr val="tx1"/>
           </a:solidFill>
@@ -2871,8 +2871,8 @@
           <a:cs typeface="+mn-cs"/>
         </a:defRPr>
       </a:lvl1pPr>
-      <a:lvl2pPr marL="997062" algn="l" defTabSz="1994124" rtl="0" eaLnBrk="1" latinLnBrk="0" hangingPunct="1">
-        <a:defRPr sz="3925" kern="1200">
+      <a:lvl2pPr marL="1219215" algn="l" defTabSz="2438430" rtl="0" eaLnBrk="1" latinLnBrk="0" hangingPunct="1">
+        <a:defRPr sz="4800" kern="1200">
           <a:solidFill>
             <a:schemeClr val="tx1"/>
           </a:solidFill>
@@ -2881,8 +2881,8 @@
           <a:cs typeface="+mn-cs"/>
         </a:defRPr>
       </a:lvl2pPr>
-      <a:lvl3pPr marL="1994124" algn="l" defTabSz="1994124" rtl="0" eaLnBrk="1" latinLnBrk="0" hangingPunct="1">
-        <a:defRPr sz="3925" kern="1200">
+      <a:lvl3pPr marL="2438430" algn="l" defTabSz="2438430" rtl="0" eaLnBrk="1" latinLnBrk="0" hangingPunct="1">
+        <a:defRPr sz="4800" kern="1200">
           <a:solidFill>
             <a:schemeClr val="tx1"/>
           </a:solidFill>
@@ -2891,8 +2891,8 @@
           <a:cs typeface="+mn-cs"/>
         </a:defRPr>
       </a:lvl3pPr>
-      <a:lvl4pPr marL="2991185" algn="l" defTabSz="1994124" rtl="0" eaLnBrk="1" latinLnBrk="0" hangingPunct="1">
-        <a:defRPr sz="3925" kern="1200">
+      <a:lvl4pPr marL="3657646" algn="l" defTabSz="2438430" rtl="0" eaLnBrk="1" latinLnBrk="0" hangingPunct="1">
+        <a:defRPr sz="4800" kern="1200">
           <a:solidFill>
             <a:schemeClr val="tx1"/>
           </a:solidFill>
@@ -2901,8 +2901,8 @@
           <a:cs typeface="+mn-cs"/>
         </a:defRPr>
       </a:lvl4pPr>
-      <a:lvl5pPr marL="3988247" algn="l" defTabSz="1994124" rtl="0" eaLnBrk="1" latinLnBrk="0" hangingPunct="1">
-        <a:defRPr sz="3925" kern="1200">
+      <a:lvl5pPr marL="4876861" algn="l" defTabSz="2438430" rtl="0" eaLnBrk="1" latinLnBrk="0" hangingPunct="1">
+        <a:defRPr sz="4800" kern="1200">
           <a:solidFill>
             <a:schemeClr val="tx1"/>
           </a:solidFill>
@@ -2911,8 +2911,8 @@
           <a:cs typeface="+mn-cs"/>
         </a:defRPr>
       </a:lvl5pPr>
-      <a:lvl6pPr marL="4985309" algn="l" defTabSz="1994124" rtl="0" eaLnBrk="1" latinLnBrk="0" hangingPunct="1">
-        <a:defRPr sz="3925" kern="1200">
+      <a:lvl6pPr marL="6096076" algn="l" defTabSz="2438430" rtl="0" eaLnBrk="1" latinLnBrk="0" hangingPunct="1">
+        <a:defRPr sz="4800" kern="1200">
           <a:solidFill>
             <a:schemeClr val="tx1"/>
           </a:solidFill>
@@ -2921,8 +2921,8 @@
           <a:cs typeface="+mn-cs"/>
         </a:defRPr>
       </a:lvl6pPr>
-      <a:lvl7pPr marL="5982371" algn="l" defTabSz="1994124" rtl="0" eaLnBrk="1" latinLnBrk="0" hangingPunct="1">
-        <a:defRPr sz="3925" kern="1200">
+      <a:lvl7pPr marL="7315291" algn="l" defTabSz="2438430" rtl="0" eaLnBrk="1" latinLnBrk="0" hangingPunct="1">
+        <a:defRPr sz="4800" kern="1200">
           <a:solidFill>
             <a:schemeClr val="tx1"/>
           </a:solidFill>
@@ -2931,8 +2931,8 @@
           <a:cs typeface="+mn-cs"/>
         </a:defRPr>
       </a:lvl7pPr>
-      <a:lvl8pPr marL="6979432" algn="l" defTabSz="1994124" rtl="0" eaLnBrk="1" latinLnBrk="0" hangingPunct="1">
-        <a:defRPr sz="3925" kern="1200">
+      <a:lvl8pPr marL="8534507" algn="l" defTabSz="2438430" rtl="0" eaLnBrk="1" latinLnBrk="0" hangingPunct="1">
+        <a:defRPr sz="4800" kern="1200">
           <a:solidFill>
             <a:schemeClr val="tx1"/>
           </a:solidFill>
@@ -2941,8 +2941,8 @@
           <a:cs typeface="+mn-cs"/>
         </a:defRPr>
       </a:lvl8pPr>
-      <a:lvl9pPr marL="7976494" algn="l" defTabSz="1994124" rtl="0" eaLnBrk="1" latinLnBrk="0" hangingPunct="1">
-        <a:defRPr sz="3925" kern="1200">
+      <a:lvl9pPr marL="9753722" algn="l" defTabSz="2438430" rtl="0" eaLnBrk="1" latinLnBrk="0" hangingPunct="1">
+        <a:defRPr sz="4800" kern="1200">
           <a:solidFill>
             <a:schemeClr val="tx1"/>
           </a:solidFill>
@@ -2975,14 +2975,960 @@
       </p:grpSpPr>
       <p:sp>
         <p:nvSpPr>
-          <p:cNvPr id="4" name="TextBox 3"/>
+          <p:cNvPr id="7" name="TextBox 6"/>
           <p:cNvSpPr txBox="1"/>
           <p:nvPr/>
         </p:nvSpPr>
         <p:spPr>
           <a:xfrm>
-            <a:off x="12177793" y="12447545"/>
-            <a:ext cx="8450407" cy="2308324"/>
+            <a:off x="665079" y="2061292"/>
+            <a:ext cx="7284946" cy="7540526"/>
+          </a:xfrm>
+          <a:prstGeom prst="rect">
+            <a:avLst/>
+          </a:prstGeom>
+          <a:solidFill>
+            <a:schemeClr val="bg1">
+              <a:lumMod val="95000"/>
+            </a:schemeClr>
+          </a:solidFill>
+          <a:ln>
+            <a:solidFill>
+              <a:schemeClr val="bg1">
+                <a:lumMod val="50000"/>
+              </a:schemeClr>
+            </a:solidFill>
+          </a:ln>
+        </p:spPr>
+        <p:txBody>
+          <a:bodyPr wrap="square" rtlCol="0">
+            <a:spAutoFit/>
+          </a:bodyPr>
+          <a:lstStyle/>
+          <a:p>
+            <a:r>
+              <a:rPr lang="en-US" sz="4400" smtClean="0"/>
+              <a:t>Obtain Data (Step 1)</a:t>
+            </a:r>
+            <a:endParaRPr lang="en-US" sz="4400"/>
+          </a:p>
+          <a:p>
+            <a:pPr marL="571500" indent="-571500">
+              <a:buFont typeface="Arial" panose="020B0604020202020204" pitchFamily="34" charset="0"/>
+              <a:buChar char="•"/>
+            </a:pPr>
+            <a:r>
+              <a:rPr lang="en-US" sz="4400"/>
+              <a:t>Download freely using </a:t>
+            </a:r>
+            <a:r>
+              <a:rPr lang="en-US" sz="4400" i="1"/>
+              <a:t>pdb_download()</a:t>
+            </a:r>
+            <a:r>
+              <a:rPr lang="en-US" sz="4400"/>
+              <a:t> .</a:t>
+            </a:r>
+          </a:p>
+          <a:p>
+            <a:pPr marL="571500" indent="-571500">
+              <a:buFont typeface="Arial" panose="020B0604020202020204" pitchFamily="34" charset="0"/>
+              <a:buChar char="•"/>
+            </a:pPr>
+            <a:r>
+              <a:rPr lang="en-US" sz="4400"/>
+              <a:t>Subset data based on Metadata table using </a:t>
+            </a:r>
+            <a:r>
+              <a:rPr lang="en-US" sz="4400" i="1"/>
+              <a:t>pdb_subset().</a:t>
+            </a:r>
+          </a:p>
+          <a:p>
+            <a:pPr marL="571500" indent="-571500">
+              <a:buFont typeface="Arial" panose="020B0604020202020204" pitchFamily="34" charset="0"/>
+              <a:buChar char="•"/>
+            </a:pPr>
+            <a:r>
+              <a:rPr lang="en-US" sz="4400"/>
+              <a:t>Generate automated metadata reports with </a:t>
+            </a:r>
+            <a:r>
+              <a:rPr lang="en-US" sz="4400" i="1"/>
+              <a:t>pdb_report</a:t>
+            </a:r>
+            <a:r>
+              <a:rPr lang="en-US" sz="4400" i="1" smtClean="0"/>
+              <a:t>().</a:t>
+            </a:r>
+          </a:p>
+          <a:p>
+            <a:pPr marL="571500" indent="-571500">
+              <a:buFont typeface="Arial" panose="020B0604020202020204" pitchFamily="34" charset="0"/>
+              <a:buChar char="•"/>
+            </a:pPr>
+            <a:r>
+              <a:rPr lang="en-US" sz="4400" smtClean="0"/>
+              <a:t>Combine with other sources of data.</a:t>
+            </a:r>
+            <a:endParaRPr lang="en-US" sz="4400"/>
+          </a:p>
+        </p:txBody>
+      </p:sp>
+      <p:sp>
+        <p:nvSpPr>
+          <p:cNvPr id="27" name="TextBox 26"/>
+          <p:cNvSpPr txBox="1"/>
+          <p:nvPr/>
+        </p:nvSpPr>
+        <p:spPr>
+          <a:xfrm>
+            <a:off x="9160148" y="2061292"/>
+            <a:ext cx="8159139" cy="5509200"/>
+          </a:xfrm>
+          <a:prstGeom prst="rect">
+            <a:avLst/>
+          </a:prstGeom>
+          <a:solidFill>
+            <a:schemeClr val="bg1">
+              <a:lumMod val="95000"/>
+            </a:schemeClr>
+          </a:solidFill>
+          <a:ln>
+            <a:solidFill>
+              <a:schemeClr val="bg1">
+                <a:lumMod val="50000"/>
+              </a:schemeClr>
+            </a:solidFill>
+          </a:ln>
+        </p:spPr>
+        <p:txBody>
+          <a:bodyPr wrap="square" rtlCol="0">
+            <a:spAutoFit/>
+          </a:bodyPr>
+          <a:lstStyle/>
+          <a:p>
+            <a:r>
+              <a:rPr lang="en-US" sz="4400"/>
+              <a:t>Create </a:t>
+            </a:r>
+            <a:r>
+              <a:rPr lang="en-US" sz="4400" i="1"/>
+              <a:t>proto_ipm</a:t>
+            </a:r>
+            <a:r>
+              <a:rPr lang="en-US" sz="4400"/>
+              <a:t>s (Step 2)</a:t>
+            </a:r>
+          </a:p>
+          <a:p>
+            <a:pPr marL="571500" indent="-571500">
+              <a:buFont typeface="Arial" panose="020B0604020202020204" pitchFamily="34" charset="0"/>
+              <a:buChar char="•"/>
+            </a:pPr>
+            <a:r>
+              <a:rPr lang="en-US" sz="4400"/>
+              <a:t>Create </a:t>
+            </a:r>
+            <a:r>
+              <a:rPr lang="en-US" sz="4400" i="1"/>
+              <a:t>proto_ipm </a:t>
+            </a:r>
+            <a:r>
+              <a:rPr lang="en-US" sz="4400"/>
+              <a:t>objects using </a:t>
+            </a:r>
+            <a:r>
+              <a:rPr lang="en-US" sz="4400" i="1"/>
+              <a:t>pdb_make_proto_ipm()</a:t>
+            </a:r>
+            <a:r>
+              <a:rPr lang="en-US" sz="4400"/>
+              <a:t>.</a:t>
+            </a:r>
+          </a:p>
+          <a:p>
+            <a:pPr marL="571500" indent="-571500">
+              <a:buFont typeface="Arial" panose="020B0604020202020204" pitchFamily="34" charset="0"/>
+              <a:buChar char="•"/>
+            </a:pPr>
+            <a:r>
+              <a:rPr lang="en-US" sz="4400"/>
+              <a:t>Optionally, combine the output with other user-defined </a:t>
+            </a:r>
+            <a:r>
+              <a:rPr lang="en-US" sz="4400" i="1"/>
+              <a:t>proto_ipm</a:t>
+            </a:r>
+            <a:r>
+              <a:rPr lang="en-US" sz="4400"/>
+              <a:t>s generated with </a:t>
+            </a:r>
+            <a:r>
+              <a:rPr lang="en-US" sz="4400" i="1" smtClean="0"/>
+              <a:t>ipmr</a:t>
+            </a:r>
+            <a:r>
+              <a:rPr lang="en-US" sz="4400" smtClean="0"/>
+              <a:t>. </a:t>
+            </a:r>
+            <a:endParaRPr lang="en-US" sz="4400"/>
+          </a:p>
+          <a:p>
+            <a:pPr marL="571500" indent="-571500">
+              <a:buFont typeface="Arial" panose="020B0604020202020204" pitchFamily="34" charset="0"/>
+              <a:buChar char="•"/>
+            </a:pPr>
+            <a:endParaRPr lang="en-US" sz="4400"/>
+          </a:p>
+        </p:txBody>
+      </p:sp>
+      <p:sp>
+        <p:nvSpPr>
+          <p:cNvPr id="29" name="TextBox 28"/>
+          <p:cNvSpPr txBox="1"/>
+          <p:nvPr/>
+        </p:nvSpPr>
+        <p:spPr>
+          <a:xfrm>
+            <a:off x="9160147" y="10432705"/>
+            <a:ext cx="8159139" cy="6186309"/>
+          </a:xfrm>
+          <a:prstGeom prst="rect">
+            <a:avLst/>
+          </a:prstGeom>
+          <a:solidFill>
+            <a:schemeClr val="bg1">
+              <a:lumMod val="95000"/>
+            </a:schemeClr>
+          </a:solidFill>
+          <a:ln>
+            <a:solidFill>
+              <a:schemeClr val="bg1">
+                <a:lumMod val="50000"/>
+              </a:schemeClr>
+            </a:solidFill>
+          </a:ln>
+        </p:spPr>
+        <p:txBody>
+          <a:bodyPr wrap="square" rtlCol="0">
+            <a:spAutoFit/>
+          </a:bodyPr>
+          <a:lstStyle/>
+          <a:p>
+            <a:r>
+              <a:rPr lang="en-US" sz="4400" i="1"/>
+              <a:t>pdb_make_proto_ipm()</a:t>
+            </a:r>
+          </a:p>
+          <a:p>
+            <a:pPr marL="571500" indent="-571500">
+              <a:buFont typeface="Arial" panose="020B0604020202020204" pitchFamily="34" charset="0"/>
+              <a:buChar char="•"/>
+            </a:pPr>
+            <a:r>
+              <a:rPr lang="en-US" sz="4400"/>
+              <a:t>Internally translates PADRINO’s syntax into </a:t>
+            </a:r>
+            <a:r>
+              <a:rPr lang="en-US" sz="4400" i="1"/>
+              <a:t>ipmr-</a:t>
+            </a:r>
+            <a:r>
+              <a:rPr lang="en-US" sz="4400"/>
+              <a:t>compatible functions. </a:t>
+            </a:r>
+          </a:p>
+          <a:p>
+            <a:pPr marL="571500" indent="-571500">
+              <a:buFont typeface="Arial" panose="020B0604020202020204" pitchFamily="34" charset="0"/>
+              <a:buChar char="•"/>
+            </a:pPr>
+            <a:r>
+              <a:rPr lang="en-US" sz="4400"/>
+              <a:t>Converts translated functions into </a:t>
+            </a:r>
+            <a:r>
+              <a:rPr lang="en-US" sz="4400" i="1"/>
+              <a:t>proto_ipm</a:t>
+            </a:r>
+            <a:r>
+              <a:rPr lang="en-US" sz="4400"/>
+              <a:t> objects.</a:t>
+            </a:r>
+          </a:p>
+          <a:p>
+            <a:pPr marL="571500" indent="-571500">
+              <a:buFont typeface="Arial" panose="020B0604020202020204" pitchFamily="34" charset="0"/>
+              <a:buChar char="•"/>
+            </a:pPr>
+            <a:r>
+              <a:rPr lang="en-US" sz="4400"/>
+              <a:t>Allows users to specify deterministic/stochastic IPMs. </a:t>
+            </a:r>
+          </a:p>
+          <a:p>
+            <a:pPr marL="571500" indent="-571500">
+              <a:buFont typeface="Arial" panose="020B0604020202020204" pitchFamily="34" charset="0"/>
+              <a:buChar char="•"/>
+            </a:pPr>
+            <a:endParaRPr lang="en-US" sz="4400"/>
+          </a:p>
+        </p:txBody>
+      </p:sp>
+      <p:sp>
+        <p:nvSpPr>
+          <p:cNvPr id="30" name="TextBox 29"/>
+          <p:cNvSpPr txBox="1"/>
+          <p:nvPr/>
+        </p:nvSpPr>
+        <p:spPr>
+          <a:xfrm>
+            <a:off x="18574069" y="2035876"/>
+            <a:ext cx="7175678" cy="4832092"/>
+          </a:xfrm>
+          <a:prstGeom prst="rect">
+            <a:avLst/>
+          </a:prstGeom>
+          <a:solidFill>
+            <a:schemeClr val="bg1">
+              <a:lumMod val="95000"/>
+            </a:schemeClr>
+          </a:solidFill>
+          <a:ln>
+            <a:solidFill>
+              <a:schemeClr val="bg1">
+                <a:lumMod val="50000"/>
+              </a:schemeClr>
+            </a:solidFill>
+          </a:ln>
+        </p:spPr>
+        <p:txBody>
+          <a:bodyPr wrap="square" rtlCol="0">
+            <a:spAutoFit/>
+          </a:bodyPr>
+          <a:lstStyle/>
+          <a:p>
+            <a:r>
+              <a:rPr lang="en-US" sz="4400"/>
+              <a:t>Create IPM objects (Step 3)</a:t>
+            </a:r>
+          </a:p>
+          <a:p>
+            <a:pPr marL="571500" indent="-571500">
+              <a:buFont typeface="Arial" panose="020B0604020202020204" pitchFamily="34" charset="0"/>
+              <a:buChar char="•"/>
+            </a:pPr>
+            <a:r>
+              <a:rPr lang="en-US" sz="4400"/>
+              <a:t>Create IPM objects using </a:t>
+            </a:r>
+            <a:r>
+              <a:rPr lang="en-US" sz="4400" i="1"/>
+              <a:t>pdb_make_ipm()</a:t>
+            </a:r>
+            <a:r>
+              <a:rPr lang="en-US" sz="4400"/>
+              <a:t>.</a:t>
+            </a:r>
+          </a:p>
+          <a:p>
+            <a:pPr marL="571500" indent="-571500">
+              <a:buFont typeface="Arial" panose="020B0604020202020204" pitchFamily="34" charset="0"/>
+              <a:buChar char="•"/>
+            </a:pPr>
+            <a:r>
+              <a:rPr lang="en-US" sz="4400"/>
+              <a:t>Use </a:t>
+            </a:r>
+            <a:r>
+              <a:rPr lang="en-US" sz="4400" i="1"/>
+              <a:t>addl_args</a:t>
+            </a:r>
+            <a:r>
+              <a:rPr lang="en-US" sz="4400"/>
+              <a:t> list to control the IPM construction process.</a:t>
+            </a:r>
+          </a:p>
+          <a:p>
+            <a:pPr marL="571500" indent="-571500">
+              <a:buFont typeface="Arial" panose="020B0604020202020204" pitchFamily="34" charset="0"/>
+              <a:buChar char="•"/>
+            </a:pPr>
+            <a:endParaRPr lang="en-US" sz="4400"/>
+          </a:p>
+        </p:txBody>
+      </p:sp>
+      <p:sp>
+        <p:nvSpPr>
+          <p:cNvPr id="33" name="TextBox 32"/>
+          <p:cNvSpPr txBox="1"/>
+          <p:nvPr/>
+        </p:nvSpPr>
+        <p:spPr>
+          <a:xfrm>
+            <a:off x="18574069" y="10432705"/>
+            <a:ext cx="7175678" cy="7540526"/>
+          </a:xfrm>
+          <a:prstGeom prst="rect">
+            <a:avLst/>
+          </a:prstGeom>
+          <a:solidFill>
+            <a:schemeClr val="bg1">
+              <a:lumMod val="95000"/>
+            </a:schemeClr>
+          </a:solidFill>
+          <a:ln>
+            <a:solidFill>
+              <a:schemeClr val="bg1">
+                <a:lumMod val="50000"/>
+              </a:schemeClr>
+            </a:solidFill>
+          </a:ln>
+        </p:spPr>
+        <p:txBody>
+          <a:bodyPr wrap="square" rtlCol="0">
+            <a:spAutoFit/>
+          </a:bodyPr>
+          <a:lstStyle/>
+          <a:p>
+            <a:r>
+              <a:rPr lang="en-US" sz="4400" i="1"/>
+              <a:t>pdb_make_ipm()</a:t>
+            </a:r>
+          </a:p>
+          <a:p>
+            <a:pPr marL="571500" indent="-571500">
+              <a:buFont typeface="Arial" panose="020B0604020202020204" pitchFamily="34" charset="0"/>
+              <a:buChar char="•"/>
+            </a:pPr>
+            <a:r>
+              <a:rPr lang="en-US" sz="4400"/>
+              <a:t>Converts </a:t>
+            </a:r>
+            <a:r>
+              <a:rPr lang="en-US" sz="4400" i="1"/>
+              <a:t>proto_ipm </a:t>
+            </a:r>
+            <a:r>
+              <a:rPr lang="en-US" sz="4400"/>
+              <a:t>objects into IPMs.  </a:t>
+            </a:r>
+          </a:p>
+          <a:p>
+            <a:pPr marL="571500" indent="-571500">
+              <a:buFont typeface="Arial" panose="020B0604020202020204" pitchFamily="34" charset="0"/>
+              <a:buChar char="•"/>
+            </a:pPr>
+            <a:r>
+              <a:rPr lang="en-US" sz="4400"/>
+              <a:t>Works for any type of IPM that </a:t>
+            </a:r>
+            <a:r>
+              <a:rPr lang="en-US" sz="4400" i="1"/>
+              <a:t>ipmr </a:t>
+            </a:r>
+            <a:r>
+              <a:rPr lang="en-US" sz="4400"/>
+              <a:t>can specify and/or is contained in PADRINO.</a:t>
+            </a:r>
+          </a:p>
+          <a:p>
+            <a:pPr marL="571500" indent="-571500">
+              <a:buFont typeface="Arial" panose="020B0604020202020204" pitchFamily="34" charset="0"/>
+              <a:buChar char="•"/>
+            </a:pPr>
+            <a:r>
+              <a:rPr lang="en-US" sz="4400"/>
+              <a:t>Produces consistent output, so users do not need to do anything different for </a:t>
+            </a:r>
+            <a:r>
+              <a:rPr lang="en-US" sz="4400" i="1"/>
+              <a:t>ipmr </a:t>
+            </a:r>
+            <a:r>
+              <a:rPr lang="en-US" sz="4400"/>
+              <a:t>IPMs versus </a:t>
+            </a:r>
+            <a:r>
+              <a:rPr lang="en-US" sz="4400" i="1"/>
+              <a:t>Rpadrino</a:t>
+            </a:r>
+            <a:r>
+              <a:rPr lang="en-US" sz="4400"/>
+              <a:t> IPMs.</a:t>
+            </a:r>
+          </a:p>
+          <a:p>
+            <a:pPr marL="571500" indent="-571500">
+              <a:buFont typeface="Arial" panose="020B0604020202020204" pitchFamily="34" charset="0"/>
+              <a:buChar char="•"/>
+            </a:pPr>
+            <a:endParaRPr lang="en-US" sz="4400"/>
+          </a:p>
+        </p:txBody>
+      </p:sp>
+      <p:sp>
+        <p:nvSpPr>
+          <p:cNvPr id="35" name="TextBox 34"/>
+          <p:cNvSpPr txBox="1"/>
+          <p:nvPr/>
+        </p:nvSpPr>
+        <p:spPr>
+          <a:xfrm>
+            <a:off x="26959870" y="2061292"/>
+            <a:ext cx="9413921" cy="3477875"/>
+          </a:xfrm>
+          <a:prstGeom prst="rect">
+            <a:avLst/>
+          </a:prstGeom>
+          <a:solidFill>
+            <a:schemeClr val="bg1">
+              <a:lumMod val="95000"/>
+            </a:schemeClr>
+          </a:solidFill>
+          <a:ln>
+            <a:solidFill>
+              <a:schemeClr val="bg1">
+                <a:lumMod val="50000"/>
+              </a:schemeClr>
+            </a:solidFill>
+          </a:ln>
+        </p:spPr>
+        <p:txBody>
+          <a:bodyPr wrap="square" rtlCol="0">
+            <a:spAutoFit/>
+          </a:bodyPr>
+          <a:lstStyle/>
+          <a:p>
+            <a:r>
+              <a:rPr lang="en-US" sz="4400"/>
+              <a:t>Conduct analysis of interest (Step 4)</a:t>
+            </a:r>
+          </a:p>
+          <a:p>
+            <a:pPr marL="571500" indent="-571500">
+              <a:buFont typeface="Arial" panose="020B0604020202020204" pitchFamily="34" charset="0"/>
+              <a:buChar char="•"/>
+            </a:pPr>
+            <a:r>
+              <a:rPr lang="en-US" sz="4400" i="1"/>
+              <a:t>Rpadrino</a:t>
+            </a:r>
+            <a:r>
+              <a:rPr lang="en-US" sz="4400"/>
+              <a:t> provides functions for some basic analyses. The vignettes and Case Studies provide guides on how to conduct more complex analyses. </a:t>
+            </a:r>
+            <a:endParaRPr lang="en-US" sz="4400" i="1"/>
+          </a:p>
+        </p:txBody>
+      </p:sp>
+      <p:sp>
+        <p:nvSpPr>
+          <p:cNvPr id="36" name="Right Arrow 35"/>
+          <p:cNvSpPr/>
+          <p:nvPr/>
+        </p:nvSpPr>
+        <p:spPr>
+          <a:xfrm>
+            <a:off x="25985721" y="2720406"/>
+            <a:ext cx="738175" cy="872108"/>
+          </a:xfrm>
+          <a:prstGeom prst="rightArrow">
+            <a:avLst/>
+          </a:prstGeom>
+          <a:solidFill>
+            <a:schemeClr val="accent5">
+              <a:lumMod val="50000"/>
+            </a:schemeClr>
+          </a:solidFill>
+          <a:ln>
+            <a:solidFill>
+              <a:schemeClr val="tx2"/>
+            </a:solidFill>
+          </a:ln>
+        </p:spPr>
+        <p:style>
+          <a:lnRef idx="2">
+            <a:schemeClr val="accent1">
+              <a:shade val="50000"/>
+            </a:schemeClr>
+          </a:lnRef>
+          <a:fillRef idx="1">
+            <a:schemeClr val="accent1"/>
+          </a:fillRef>
+          <a:effectRef idx="0">
+            <a:schemeClr val="accent1"/>
+          </a:effectRef>
+          <a:fontRef idx="minor">
+            <a:schemeClr val="lt1"/>
+          </a:fontRef>
+        </p:style>
+        <p:txBody>
+          <a:bodyPr rtlCol="0" anchor="ctr"/>
+          <a:lstStyle/>
+          <a:p>
+            <a:pPr algn="ctr"/>
+            <a:endParaRPr lang="en-US" sz="4400"/>
+          </a:p>
+        </p:txBody>
+      </p:sp>
+      <p:sp>
+        <p:nvSpPr>
+          <p:cNvPr id="38" name="TextBox 37"/>
+          <p:cNvSpPr txBox="1"/>
+          <p:nvPr/>
+        </p:nvSpPr>
+        <p:spPr>
+          <a:xfrm>
+            <a:off x="26959870" y="10432705"/>
+            <a:ext cx="9413921" cy="6863417"/>
+          </a:xfrm>
+          <a:prstGeom prst="rect">
+            <a:avLst/>
+          </a:prstGeom>
+          <a:solidFill>
+            <a:schemeClr val="bg1">
+              <a:lumMod val="95000"/>
+            </a:schemeClr>
+          </a:solidFill>
+          <a:ln>
+            <a:solidFill>
+              <a:schemeClr val="bg1">
+                <a:lumMod val="50000"/>
+              </a:schemeClr>
+            </a:solidFill>
+          </a:ln>
+        </p:spPr>
+        <p:txBody>
+          <a:bodyPr wrap="square" rtlCol="0">
+            <a:spAutoFit/>
+          </a:bodyPr>
+          <a:lstStyle/>
+          <a:p>
+            <a:r>
+              <a:rPr lang="en-US" sz="4400" i="1"/>
+              <a:t>ipmr </a:t>
+            </a:r>
+            <a:r>
+              <a:rPr lang="en-US" sz="4400"/>
+              <a:t>integration for subsequent analyses </a:t>
+            </a:r>
+          </a:p>
+          <a:p>
+            <a:pPr marL="571500" indent="-571500">
+              <a:buFont typeface="Arial" panose="020B0604020202020204" pitchFamily="34" charset="0"/>
+              <a:buChar char="•"/>
+            </a:pPr>
+            <a:r>
+              <a:rPr lang="en-US" sz="4400"/>
+              <a:t>Nearly every function from </a:t>
+            </a:r>
+            <a:r>
+              <a:rPr lang="en-US" sz="4400" i="1"/>
+              <a:t>ipmr</a:t>
+            </a:r>
+            <a:r>
+              <a:rPr lang="en-US" sz="4400"/>
+              <a:t> is generic and has methods for equivalent objects in </a:t>
+            </a:r>
+            <a:r>
+              <a:rPr lang="en-US" sz="4400" i="1"/>
+              <a:t>Rpadrino</a:t>
+            </a:r>
+            <a:r>
+              <a:rPr lang="en-US" sz="4400"/>
+              <a:t>. Users uninterested in learning about </a:t>
+            </a:r>
+            <a:r>
+              <a:rPr lang="en-US" sz="4400" i="1"/>
+              <a:t>ipmr</a:t>
+            </a:r>
+            <a:r>
+              <a:rPr lang="en-US" sz="4400"/>
+              <a:t> can simply consult the </a:t>
+            </a:r>
+            <a:r>
+              <a:rPr lang="en-US" sz="4400" i="1"/>
+              <a:t>Rpadrino</a:t>
+            </a:r>
+            <a:r>
+              <a:rPr lang="en-US" sz="4400"/>
+              <a:t> documentation of each of these functions. </a:t>
+            </a:r>
+          </a:p>
+          <a:p>
+            <a:pPr marL="571500" indent="-571500">
+              <a:buFont typeface="Arial" panose="020B0604020202020204" pitchFamily="34" charset="0"/>
+              <a:buChar char="•"/>
+            </a:pPr>
+            <a:endParaRPr lang="en-US" sz="4400"/>
+          </a:p>
+        </p:txBody>
+      </p:sp>
+      <p:sp>
+        <p:nvSpPr>
+          <p:cNvPr id="14" name="Right Arrow 13"/>
+          <p:cNvSpPr/>
+          <p:nvPr/>
+        </p:nvSpPr>
+        <p:spPr>
+          <a:xfrm>
+            <a:off x="17577590" y="2720406"/>
+            <a:ext cx="738175" cy="872108"/>
+          </a:xfrm>
+          <a:prstGeom prst="rightArrow">
+            <a:avLst/>
+          </a:prstGeom>
+          <a:solidFill>
+            <a:schemeClr val="accent5">
+              <a:lumMod val="50000"/>
+            </a:schemeClr>
+          </a:solidFill>
+          <a:ln>
+            <a:solidFill>
+              <a:schemeClr val="tx2"/>
+            </a:solidFill>
+          </a:ln>
+        </p:spPr>
+        <p:style>
+          <a:lnRef idx="2">
+            <a:schemeClr val="accent1">
+              <a:shade val="50000"/>
+            </a:schemeClr>
+          </a:lnRef>
+          <a:fillRef idx="1">
+            <a:schemeClr val="accent1"/>
+          </a:fillRef>
+          <a:effectRef idx="0">
+            <a:schemeClr val="accent1"/>
+          </a:effectRef>
+          <a:fontRef idx="minor">
+            <a:schemeClr val="lt1"/>
+          </a:fontRef>
+        </p:style>
+        <p:txBody>
+          <a:bodyPr rtlCol="0" anchor="ctr"/>
+          <a:lstStyle/>
+          <a:p>
+            <a:pPr algn="ctr"/>
+            <a:endParaRPr lang="en-US" sz="4400"/>
+          </a:p>
+        </p:txBody>
+      </p:sp>
+      <p:sp>
+        <p:nvSpPr>
+          <p:cNvPr id="15" name="Right Arrow 14"/>
+          <p:cNvSpPr/>
+          <p:nvPr/>
+        </p:nvSpPr>
+        <p:spPr>
+          <a:xfrm>
+            <a:off x="8185999" y="2720406"/>
+            <a:ext cx="738175" cy="872108"/>
+          </a:xfrm>
+          <a:prstGeom prst="rightArrow">
+            <a:avLst/>
+          </a:prstGeom>
+          <a:solidFill>
+            <a:schemeClr val="accent5">
+              <a:lumMod val="50000"/>
+            </a:schemeClr>
+          </a:solidFill>
+          <a:ln>
+            <a:solidFill>
+              <a:schemeClr val="tx2"/>
+            </a:solidFill>
+          </a:ln>
+        </p:spPr>
+        <p:style>
+          <a:lnRef idx="2">
+            <a:schemeClr val="accent1">
+              <a:shade val="50000"/>
+            </a:schemeClr>
+          </a:lnRef>
+          <a:fillRef idx="1">
+            <a:schemeClr val="accent1"/>
+          </a:fillRef>
+          <a:effectRef idx="0">
+            <a:schemeClr val="accent1"/>
+          </a:effectRef>
+          <a:fontRef idx="minor">
+            <a:schemeClr val="lt1"/>
+          </a:fontRef>
+        </p:style>
+        <p:txBody>
+          <a:bodyPr rtlCol="0" anchor="ctr"/>
+          <a:lstStyle/>
+          <a:p>
+            <a:pPr algn="ctr"/>
+            <a:endParaRPr lang="en-US" sz="4400"/>
+          </a:p>
+        </p:txBody>
+      </p:sp>
+      <p:sp>
+        <p:nvSpPr>
+          <p:cNvPr id="2" name="Down Arrow 1"/>
+          <p:cNvSpPr/>
+          <p:nvPr/>
+        </p:nvSpPr>
+        <p:spPr>
+          <a:xfrm>
+            <a:off x="12805962" y="7995138"/>
+            <a:ext cx="867508" cy="2032247"/>
+          </a:xfrm>
+          <a:prstGeom prst="downArrow">
+            <a:avLst/>
+          </a:prstGeom>
+          <a:solidFill>
+            <a:schemeClr val="accent3">
+              <a:lumMod val="60000"/>
+              <a:lumOff val="40000"/>
+            </a:schemeClr>
+          </a:solidFill>
+          <a:ln>
+            <a:solidFill>
+              <a:schemeClr val="tx1"/>
+            </a:solidFill>
+          </a:ln>
+        </p:spPr>
+        <p:style>
+          <a:lnRef idx="2">
+            <a:schemeClr val="accent3">
+              <a:shade val="50000"/>
+            </a:schemeClr>
+          </a:lnRef>
+          <a:fillRef idx="1">
+            <a:schemeClr val="accent3"/>
+          </a:fillRef>
+          <a:effectRef idx="0">
+            <a:schemeClr val="accent3"/>
+          </a:effectRef>
+          <a:fontRef idx="minor">
+            <a:schemeClr val="lt1"/>
+          </a:fontRef>
+        </p:style>
+        <p:txBody>
+          <a:bodyPr rtlCol="0" anchor="ctr"/>
+          <a:lstStyle/>
+          <a:p>
+            <a:pPr algn="ctr"/>
+            <a:endParaRPr lang="en-US"/>
+          </a:p>
+        </p:txBody>
+      </p:sp>
+      <p:sp>
+        <p:nvSpPr>
+          <p:cNvPr id="16" name="Down Arrow 15"/>
+          <p:cNvSpPr/>
+          <p:nvPr/>
+        </p:nvSpPr>
+        <p:spPr>
+          <a:xfrm>
+            <a:off x="21728154" y="7268308"/>
+            <a:ext cx="867508" cy="2759078"/>
+          </a:xfrm>
+          <a:prstGeom prst="downArrow">
+            <a:avLst/>
+          </a:prstGeom>
+          <a:solidFill>
+            <a:schemeClr val="accent3">
+              <a:lumMod val="60000"/>
+              <a:lumOff val="40000"/>
+            </a:schemeClr>
+          </a:solidFill>
+          <a:ln>
+            <a:solidFill>
+              <a:schemeClr val="tx1"/>
+            </a:solidFill>
+          </a:ln>
+        </p:spPr>
+        <p:style>
+          <a:lnRef idx="2">
+            <a:schemeClr val="accent3">
+              <a:shade val="50000"/>
+            </a:schemeClr>
+          </a:lnRef>
+          <a:fillRef idx="1">
+            <a:schemeClr val="accent3"/>
+          </a:fillRef>
+          <a:effectRef idx="0">
+            <a:schemeClr val="accent3"/>
+          </a:effectRef>
+          <a:fontRef idx="minor">
+            <a:schemeClr val="lt1"/>
+          </a:fontRef>
+        </p:style>
+        <p:txBody>
+          <a:bodyPr rtlCol="0" anchor="ctr"/>
+          <a:lstStyle/>
+          <a:p>
+            <a:pPr algn="ctr"/>
+            <a:endParaRPr lang="en-US"/>
+          </a:p>
+        </p:txBody>
+      </p:sp>
+      <p:sp>
+        <p:nvSpPr>
+          <p:cNvPr id="17" name="Down Arrow 16"/>
+          <p:cNvSpPr/>
+          <p:nvPr/>
+        </p:nvSpPr>
+        <p:spPr>
+          <a:xfrm>
+            <a:off x="31334181" y="5931877"/>
+            <a:ext cx="867508" cy="4095507"/>
+          </a:xfrm>
+          <a:prstGeom prst="downArrow">
+            <a:avLst/>
+          </a:prstGeom>
+          <a:solidFill>
+            <a:schemeClr val="accent3">
+              <a:lumMod val="60000"/>
+              <a:lumOff val="40000"/>
+            </a:schemeClr>
+          </a:solidFill>
+          <a:ln>
+            <a:solidFill>
+              <a:schemeClr val="tx1"/>
+            </a:solidFill>
+          </a:ln>
+        </p:spPr>
+        <p:style>
+          <a:lnRef idx="2">
+            <a:schemeClr val="accent3">
+              <a:shade val="50000"/>
+            </a:schemeClr>
+          </a:lnRef>
+          <a:fillRef idx="1">
+            <a:schemeClr val="accent3"/>
+          </a:fillRef>
+          <a:effectRef idx="0">
+            <a:schemeClr val="accent3"/>
+          </a:effectRef>
+          <a:fontRef idx="minor">
+            <a:schemeClr val="lt1"/>
+          </a:fontRef>
+        </p:style>
+        <p:txBody>
+          <a:bodyPr rtlCol="0" anchor="ctr"/>
+          <a:lstStyle/>
+          <a:p>
+            <a:pPr algn="ctr"/>
+            <a:endParaRPr lang="en-US"/>
+          </a:p>
+        </p:txBody>
+      </p:sp>
+      <p:sp>
+        <p:nvSpPr>
+          <p:cNvPr id="5" name="TextBox 4"/>
+          <p:cNvSpPr txBox="1"/>
+          <p:nvPr/>
+        </p:nvSpPr>
+        <p:spPr>
+          <a:xfrm>
+            <a:off x="665079" y="445477"/>
+            <a:ext cx="7284946" cy="830997"/>
           </a:xfrm>
           <a:prstGeom prst="rect">
             <a:avLst/>
@@ -3009,56 +3955,27 @@
           <a:lstStyle/>
           <a:p>
             <a:r>
-              <a:rPr lang="en-US" sz="3600" dirty="0" err="1"/>
-              <a:t>ipmr</a:t>
-            </a:r>
-            <a:endParaRPr lang="en-US" sz="3600" dirty="0"/>
-          </a:p>
-          <a:p>
-            <a:pPr marL="623152" indent="-623152">
-              <a:buFont typeface="Arial" panose="020B0604020202020204" pitchFamily="34" charset="0"/>
-              <a:buChar char="•"/>
-            </a:pPr>
-            <a:r>
-              <a:rPr lang="en-US" sz="3600" dirty="0"/>
-              <a:t>General engine for implementing IPMs with R.</a:t>
-            </a:r>
-          </a:p>
-          <a:p>
-            <a:pPr marL="623152" indent="-623152">
-              <a:buFont typeface="Arial" panose="020B0604020202020204" pitchFamily="34" charset="0"/>
-              <a:buChar char="•"/>
-            </a:pPr>
-            <a:r>
-              <a:rPr lang="en-US" sz="3600" dirty="0"/>
-              <a:t>Is not specific to PADRINO </a:t>
-            </a:r>
-            <a:r>
-              <a:rPr lang="en-US" sz="3600"/>
-              <a:t>or </a:t>
-            </a:r>
-            <a:r>
-              <a:rPr lang="en-US" sz="3600"/>
-              <a:t>RPadrino</a:t>
-            </a:r>
-            <a:r>
-              <a:rPr lang="en-US" sz="3457"/>
-              <a:t>.</a:t>
-            </a:r>
-            <a:endParaRPr lang="en-US" sz="3457" dirty="0"/>
-          </a:p>
-        </p:txBody>
-      </p:sp>
-      <p:sp>
-        <p:nvSpPr>
-          <p:cNvPr id="5" name="TextBox 4"/>
+              <a:rPr lang="en-US" sz="4800" i="1" smtClean="0"/>
+              <a:t>Rpadrino</a:t>
+            </a:r>
+            <a:r>
+              <a:rPr lang="en-US" sz="4800" smtClean="0"/>
+              <a:t> Workflow</a:t>
+            </a:r>
+            <a:endParaRPr lang="en-US" sz="4800"/>
+          </a:p>
+        </p:txBody>
+      </p:sp>
+      <p:sp>
+        <p:nvSpPr>
+          <p:cNvPr id="20" name="TextBox 19"/>
           <p:cNvSpPr txBox="1"/>
           <p:nvPr/>
         </p:nvSpPr>
         <p:spPr>
           <a:xfrm>
-            <a:off x="12177793" y="7586212"/>
-            <a:ext cx="8450407" cy="4524315"/>
+            <a:off x="665079" y="10433518"/>
+            <a:ext cx="7284946" cy="1569660"/>
           </a:xfrm>
           <a:prstGeom prst="rect">
             <a:avLst/>
@@ -3085,1302 +4002,17 @@
           <a:lstStyle/>
           <a:p>
             <a:r>
-              <a:rPr lang="en-US" sz="3600" dirty="0" err="1"/>
-              <a:t>RPadrino</a:t>
-            </a:r>
-            <a:endParaRPr lang="en-US" sz="3600" dirty="0"/>
-          </a:p>
-          <a:p>
-            <a:pPr marL="623152" indent="-623152">
-              <a:buFont typeface="Arial" panose="020B0604020202020204" pitchFamily="34" charset="0"/>
-              <a:buChar char="•"/>
-            </a:pPr>
-            <a:r>
-              <a:rPr lang="en-US" sz="3600" dirty="0"/>
-              <a:t>Downloads, saves, loads, and subsets IPMs in PADRINO.</a:t>
-            </a:r>
-          </a:p>
-          <a:p>
-            <a:pPr marL="623152" indent="-623152">
-              <a:buFont typeface="Arial" panose="020B0604020202020204" pitchFamily="34" charset="0"/>
-              <a:buChar char="•"/>
-            </a:pPr>
-            <a:r>
-              <a:rPr lang="en-US" sz="3600" dirty="0"/>
-              <a:t>Translates PADRINO syntax into </a:t>
-            </a:r>
-            <a:r>
-              <a:rPr lang="en-US" sz="3600" err="1"/>
+              <a:rPr lang="en-US" sz="4800" smtClean="0"/>
+              <a:t>Additional Details and Connection to </a:t>
+            </a:r>
+            <a:r>
+              <a:rPr lang="en-US" sz="4800" i="1" smtClean="0"/>
               <a:t>ipmr</a:t>
             </a:r>
-            <a:r>
-              <a:rPr lang="en-US" sz="3600"/>
-              <a:t> </a:t>
-            </a:r>
-            <a:r>
-              <a:rPr lang="en-US" sz="3600"/>
-              <a:t>syntax </a:t>
-            </a:r>
-            <a:r>
-              <a:rPr lang="en-US" sz="3600">
-                <a:latin typeface="Courier New" panose="02070309020205020404" pitchFamily="49" charset="0"/>
-                <a:cs typeface="Courier New" panose="02070309020205020404" pitchFamily="49" charset="0"/>
-              </a:rPr>
-              <a:t>(pdb_make_proto_ipm()</a:t>
-            </a:r>
-            <a:r>
-              <a:rPr lang="en-US" sz="3600">
-                <a:cs typeface="Courier New" panose="02070309020205020404" pitchFamily="49" charset="0"/>
-              </a:rPr>
-              <a:t>).</a:t>
-            </a:r>
-            <a:endParaRPr lang="en-US" sz="3600" dirty="0">
-              <a:cs typeface="Courier New" panose="02070309020205020404" pitchFamily="49" charset="0"/>
-            </a:endParaRPr>
-          </a:p>
-          <a:p>
-            <a:pPr marL="623152" indent="-623152">
-              <a:buFont typeface="Arial" panose="020B0604020202020204" pitchFamily="34" charset="0"/>
-              <a:buChar char="•"/>
-            </a:pPr>
-            <a:r>
-              <a:rPr lang="en-US" sz="3600" dirty="0"/>
-              <a:t>Provides </a:t>
-            </a:r>
-            <a:r>
-              <a:rPr lang="en-US" sz="3600" dirty="0" err="1"/>
-              <a:t>ipmr</a:t>
-            </a:r>
-            <a:r>
-              <a:rPr lang="en-US" sz="3600" dirty="0"/>
-              <a:t>-like analysis functionality for </a:t>
-            </a:r>
-            <a:r>
-              <a:rPr lang="en-US" sz="3600"/>
-              <a:t>PADRINO </a:t>
-            </a:r>
-            <a:r>
-              <a:rPr lang="en-US" sz="3600"/>
-              <a:t>objects </a:t>
-            </a:r>
-            <a:r>
-              <a:rPr lang="en-US" sz="3600">
-                <a:cs typeface="Courier New" panose="02070309020205020404" pitchFamily="49" charset="0"/>
-              </a:rPr>
-              <a:t>(</a:t>
-            </a:r>
-            <a:r>
-              <a:rPr lang="en-US" sz="3600">
-                <a:latin typeface="Courier New" panose="02070309020205020404" pitchFamily="49" charset="0"/>
-                <a:cs typeface="Courier New" panose="02070309020205020404" pitchFamily="49" charset="0"/>
-              </a:rPr>
-              <a:t>pdb_make_ipm()</a:t>
-            </a:r>
-            <a:r>
-              <a:rPr lang="en-US" sz="3600">
-                <a:cs typeface="Courier New" panose="02070309020205020404" pitchFamily="49" charset="0"/>
-              </a:rPr>
-              <a:t>).</a:t>
-            </a:r>
-            <a:endParaRPr lang="en-US" sz="3600" dirty="0">
-              <a:latin typeface="Courier New" panose="02070309020205020404" pitchFamily="49" charset="0"/>
-              <a:cs typeface="Courier New" panose="02070309020205020404" pitchFamily="49" charset="0"/>
-            </a:endParaRPr>
-          </a:p>
-        </p:txBody>
-      </p:sp>
-      <p:sp>
-        <p:nvSpPr>
-          <p:cNvPr id="6" name="TextBox 5"/>
-          <p:cNvSpPr txBox="1"/>
-          <p:nvPr/>
-        </p:nvSpPr>
-        <p:spPr>
-          <a:xfrm>
-            <a:off x="22718688" y="3929067"/>
-            <a:ext cx="8369453" cy="1754326"/>
-          </a:xfrm>
-          <a:prstGeom prst="rect">
-            <a:avLst/>
-          </a:prstGeom>
-        </p:spPr>
-        <p:style>
-          <a:lnRef idx="2">
-            <a:schemeClr val="dk1"/>
-          </a:lnRef>
-          <a:fillRef idx="1">
-            <a:schemeClr val="lt1"/>
-          </a:fillRef>
-          <a:effectRef idx="0">
-            <a:schemeClr val="dk1"/>
-          </a:effectRef>
-          <a:fontRef idx="minor">
-            <a:schemeClr val="dk1"/>
-          </a:fontRef>
-        </p:style>
-        <p:txBody>
-          <a:bodyPr wrap="square" rtlCol="0">
-            <a:spAutoFit/>
-          </a:bodyPr>
-          <a:lstStyle/>
-          <a:p>
-            <a:r>
-              <a:rPr lang="en-US" sz="3600" dirty="0" err="1"/>
-              <a:t>pdbDigitUtils</a:t>
-            </a:r>
-            <a:endParaRPr lang="en-US" sz="3600" dirty="0"/>
-          </a:p>
-          <a:p>
-            <a:pPr marL="623152" indent="-623152">
-              <a:buFont typeface="Arial" panose="020B0604020202020204" pitchFamily="34" charset="0"/>
-              <a:buChar char="•"/>
-            </a:pPr>
-            <a:r>
-              <a:rPr lang="en-US" sz="3600" dirty="0"/>
-              <a:t>Tests models after entry by digitization </a:t>
-            </a:r>
-            <a:r>
-              <a:rPr lang="en-US" sz="3600" dirty="0"/>
-              <a:t>team to verify IPM behavior. </a:t>
-            </a:r>
-            <a:endParaRPr lang="en-US" sz="3600" dirty="0"/>
-          </a:p>
-        </p:txBody>
-      </p:sp>
-      <p:cxnSp>
-        <p:nvCxnSpPr>
-          <p:cNvPr id="9" name="Straight Arrow Connector 8"/>
-          <p:cNvCxnSpPr>
-            <a:stCxn id="5" idx="2"/>
-          </p:cNvCxnSpPr>
-          <p:nvPr/>
-        </p:nvCxnSpPr>
-        <p:spPr>
-          <a:xfrm>
-            <a:off x="16402997" y="12110527"/>
-            <a:ext cx="2888" cy="337019"/>
-          </a:xfrm>
-          <a:prstGeom prst="straightConnector1">
-            <a:avLst/>
-          </a:prstGeom>
-          <a:ln>
-            <a:tailEnd type="triangle"/>
-          </a:ln>
-        </p:spPr>
-        <p:style>
-          <a:lnRef idx="3">
-            <a:schemeClr val="dk1"/>
-          </a:lnRef>
-          <a:fillRef idx="0">
-            <a:schemeClr val="dk1"/>
-          </a:fillRef>
-          <a:effectRef idx="2">
-            <a:schemeClr val="dk1"/>
-          </a:effectRef>
-          <a:fontRef idx="minor">
-            <a:schemeClr val="tx1"/>
-          </a:fontRef>
-        </p:style>
-      </p:cxnSp>
-      <p:sp>
-        <p:nvSpPr>
-          <p:cNvPr id="10" name="TextBox 9"/>
-          <p:cNvSpPr txBox="1"/>
-          <p:nvPr/>
-        </p:nvSpPr>
-        <p:spPr>
-          <a:xfrm>
-            <a:off x="12183569" y="3929067"/>
-            <a:ext cx="8444630" cy="2862322"/>
-          </a:xfrm>
-          <a:prstGeom prst="rect">
-            <a:avLst/>
-          </a:prstGeom>
-        </p:spPr>
-        <p:style>
-          <a:lnRef idx="2">
-            <a:schemeClr val="dk1"/>
-          </a:lnRef>
-          <a:fillRef idx="1">
-            <a:schemeClr val="lt1"/>
-          </a:fillRef>
-          <a:effectRef idx="0">
-            <a:schemeClr val="dk1"/>
-          </a:effectRef>
-          <a:fontRef idx="minor">
-            <a:schemeClr val="dk1"/>
-          </a:fontRef>
-        </p:style>
-        <p:txBody>
-          <a:bodyPr wrap="square" rtlCol="0">
-            <a:spAutoFit/>
-          </a:bodyPr>
-          <a:lstStyle/>
-          <a:p>
-            <a:r>
-              <a:rPr lang="en-US" sz="3600" dirty="0"/>
-              <a:t>PADRINO</a:t>
-            </a:r>
-          </a:p>
-          <a:p>
-            <a:pPr marL="623152" indent="-623152">
-              <a:buFont typeface="Arial" panose="020B0604020202020204" pitchFamily="34" charset="0"/>
-              <a:buChar char="•"/>
-            </a:pPr>
-            <a:r>
-              <a:rPr lang="en-US" sz="3600" dirty="0"/>
-              <a:t>Stores IPM metadata, implementation details, and functional forms.</a:t>
-            </a:r>
-          </a:p>
-          <a:p>
-            <a:pPr marL="623152" indent="-623152">
-              <a:buFont typeface="Arial" panose="020B0604020202020204" pitchFamily="34" charset="0"/>
-              <a:buChar char="•"/>
-            </a:pPr>
-            <a:r>
-              <a:rPr lang="en-US" sz="3600" dirty="0"/>
-              <a:t>Available for download using </a:t>
-            </a:r>
-            <a:r>
-              <a:rPr lang="en-US" sz="3600"/>
-              <a:t>the </a:t>
-            </a:r>
-            <a:r>
-              <a:rPr lang="en-US" sz="3600"/>
-              <a:t>RPadrino </a:t>
-            </a:r>
-            <a:r>
-              <a:rPr lang="en-US" sz="3600" dirty="0"/>
-              <a:t>package.</a:t>
-            </a:r>
-          </a:p>
-        </p:txBody>
-      </p:sp>
-      <p:sp>
-        <p:nvSpPr>
-          <p:cNvPr id="16" name="TextBox 15"/>
-          <p:cNvSpPr txBox="1"/>
-          <p:nvPr/>
-        </p:nvSpPr>
-        <p:spPr>
-          <a:xfrm>
-            <a:off x="12177793" y="206996"/>
-            <a:ext cx="8450407" cy="2308324"/>
-          </a:xfrm>
-          <a:prstGeom prst="rect">
-            <a:avLst/>
-          </a:prstGeom>
-        </p:spPr>
-        <p:style>
-          <a:lnRef idx="2">
-            <a:schemeClr val="dk1"/>
-          </a:lnRef>
-          <a:fillRef idx="1">
-            <a:schemeClr val="lt1"/>
-          </a:fillRef>
-          <a:effectRef idx="0">
-            <a:schemeClr val="dk1"/>
-          </a:effectRef>
-          <a:fontRef idx="minor">
-            <a:schemeClr val="dk1"/>
-          </a:fontRef>
-        </p:style>
-        <p:txBody>
-          <a:bodyPr wrap="square" rtlCol="0">
-            <a:spAutoFit/>
-          </a:bodyPr>
-          <a:lstStyle/>
-          <a:p>
-            <a:r>
-              <a:rPr lang="en-US" sz="3600" dirty="0"/>
-              <a:t>Paper published</a:t>
-            </a:r>
-            <a:endParaRPr lang="en-US" sz="3600" dirty="0"/>
-          </a:p>
-          <a:p>
-            <a:pPr marL="623152" indent="-623152">
-              <a:buFont typeface="Arial" panose="020B0604020202020204" pitchFamily="34" charset="0"/>
-              <a:buChar char="•"/>
-            </a:pPr>
-            <a:r>
-              <a:rPr lang="en-US" sz="3600" dirty="0"/>
-              <a:t>Reports information associated with an IPM.</a:t>
-            </a:r>
-          </a:p>
-          <a:p>
-            <a:pPr marL="623152" indent="-623152">
-              <a:buFont typeface="Arial" panose="020B0604020202020204" pitchFamily="34" charset="0"/>
-              <a:buChar char="•"/>
-            </a:pPr>
-            <a:r>
-              <a:rPr lang="en-US" sz="3600" dirty="0"/>
-              <a:t>We digitize this into PADRINO.</a:t>
-            </a:r>
-          </a:p>
-        </p:txBody>
-      </p:sp>
-      <p:cxnSp>
-        <p:nvCxnSpPr>
-          <p:cNvPr id="17" name="Straight Arrow Connector 16"/>
-          <p:cNvCxnSpPr>
-            <a:stCxn id="16" idx="2"/>
-            <a:endCxn id="6" idx="0"/>
-          </p:cNvCxnSpPr>
-          <p:nvPr/>
-        </p:nvCxnSpPr>
-        <p:spPr>
-          <a:xfrm>
-            <a:off x="16402997" y="2515320"/>
-            <a:ext cx="10500418" cy="1413747"/>
-          </a:xfrm>
-          <a:prstGeom prst="straightConnector1">
-            <a:avLst/>
-          </a:prstGeom>
-          <a:ln>
-            <a:tailEnd type="triangle"/>
-          </a:ln>
-        </p:spPr>
-        <p:style>
-          <a:lnRef idx="3">
-            <a:schemeClr val="dk1"/>
-          </a:lnRef>
-          <a:fillRef idx="0">
-            <a:schemeClr val="dk1"/>
-          </a:fillRef>
-          <a:effectRef idx="2">
-            <a:schemeClr val="dk1"/>
-          </a:effectRef>
-          <a:fontRef idx="minor">
-            <a:schemeClr val="tx1"/>
-          </a:fontRef>
-        </p:style>
-      </p:cxnSp>
-      <p:cxnSp>
-        <p:nvCxnSpPr>
-          <p:cNvPr id="20" name="Straight Arrow Connector 19"/>
-          <p:cNvCxnSpPr>
-            <a:stCxn id="16" idx="2"/>
-            <a:endCxn id="10" idx="0"/>
-          </p:cNvCxnSpPr>
-          <p:nvPr/>
-        </p:nvCxnSpPr>
-        <p:spPr>
-          <a:xfrm>
-            <a:off x="16402997" y="2515320"/>
-            <a:ext cx="2887" cy="1413747"/>
-          </a:xfrm>
-          <a:prstGeom prst="straightConnector1">
-            <a:avLst/>
-          </a:prstGeom>
-          <a:ln>
-            <a:tailEnd type="triangle"/>
-          </a:ln>
-        </p:spPr>
-        <p:style>
-          <a:lnRef idx="3">
-            <a:schemeClr val="dk1"/>
-          </a:lnRef>
-          <a:fillRef idx="0">
-            <a:schemeClr val="dk1"/>
-          </a:fillRef>
-          <a:effectRef idx="2">
-            <a:schemeClr val="dk1"/>
-          </a:effectRef>
-          <a:fontRef idx="minor">
-            <a:schemeClr val="tx1"/>
-          </a:fontRef>
-        </p:style>
-      </p:cxnSp>
-      <mc:AlternateContent xmlns:mc="http://schemas.openxmlformats.org/markup-compatibility/2006">
-        <mc:Choice xmlns:a14="http://schemas.microsoft.com/office/drawing/2010/main" Requires="a14">
-          <p:sp>
-            <p:nvSpPr>
-              <p:cNvPr id="32" name="TextBox 31"/>
-              <p:cNvSpPr txBox="1"/>
-              <p:nvPr/>
-            </p:nvSpPr>
-            <p:spPr>
-              <a:xfrm>
-                <a:off x="886644" y="206996"/>
-                <a:ext cx="9178547" cy="3420680"/>
-              </a:xfrm>
-              <a:prstGeom prst="rect">
-                <a:avLst/>
-              </a:prstGeom>
-            </p:spPr>
-            <p:style>
-              <a:lnRef idx="2">
-                <a:schemeClr val="dk1"/>
-              </a:lnRef>
-              <a:fillRef idx="1">
-                <a:schemeClr val="lt1"/>
-              </a:fillRef>
-              <a:effectRef idx="0">
-                <a:schemeClr val="dk1"/>
-              </a:effectRef>
-              <a:fontRef idx="minor">
-                <a:schemeClr val="dk1"/>
-              </a:fontRef>
-            </p:style>
-            <p:txBody>
-              <a:bodyPr wrap="square" rtlCol="0">
-                <a:spAutoFit/>
-              </a:bodyPr>
-              <a:lstStyle/>
-              <a:p>
-                <a:pPr/>
-                <a14:m>
-                  <m:oMathPara xmlns:m="http://schemas.openxmlformats.org/officeDocument/2006/math">
-                    <m:oMathParaPr>
-                      <m:jc m:val="left"/>
-                    </m:oMathParaPr>
-                    <m:oMath xmlns:m="http://schemas.openxmlformats.org/officeDocument/2006/math">
-                      <m:r>
-                        <a:rPr lang="en-US" sz="3600" i="1">
-                          <a:latin typeface="Cambria Math" panose="02040503050406030204" pitchFamily="18" charset="0"/>
-                        </a:rPr>
-                        <m:t>𝑛</m:t>
-                      </m:r>
-                      <m:d>
-                        <m:dPr>
-                          <m:ctrlPr>
-                            <a:rPr lang="en-US" sz="3600" i="1">
-                              <a:latin typeface="Cambria Math" panose="02040503050406030204" pitchFamily="18" charset="0"/>
-                            </a:rPr>
-                          </m:ctrlPr>
-                        </m:dPr>
-                        <m:e>
-                          <m:sSup>
-                            <m:sSupPr>
-                              <m:ctrlPr>
-                                <a:rPr lang="en-US" sz="3600" i="1">
-                                  <a:latin typeface="Cambria Math" panose="02040503050406030204" pitchFamily="18" charset="0"/>
-                                </a:rPr>
-                              </m:ctrlPr>
-                            </m:sSupPr>
-                            <m:e>
-                              <m:r>
-                                <a:rPr lang="en-US" sz="3600" i="1">
-                                  <a:latin typeface="Cambria Math" panose="02040503050406030204" pitchFamily="18" charset="0"/>
-                                </a:rPr>
-                                <m:t>𝑧</m:t>
-                              </m:r>
-                            </m:e>
-                            <m:sup>
-                              <m:r>
-                                <a:rPr lang="en-US" sz="3600" i="1">
-                                  <a:latin typeface="Cambria Math" panose="02040503050406030204" pitchFamily="18" charset="0"/>
-                                </a:rPr>
-                                <m:t>′</m:t>
-                              </m:r>
-                            </m:sup>
-                          </m:sSup>
-                          <m:r>
-                            <a:rPr lang="en-US" sz="3600" i="1">
-                              <a:latin typeface="Cambria Math" panose="02040503050406030204" pitchFamily="18" charset="0"/>
-                            </a:rPr>
-                            <m:t>, </m:t>
-                          </m:r>
-                          <m:r>
-                            <a:rPr lang="en-US" sz="3600" i="1">
-                              <a:latin typeface="Cambria Math" panose="02040503050406030204" pitchFamily="18" charset="0"/>
-                            </a:rPr>
-                            <m:t>𝑡</m:t>
-                          </m:r>
-                          <m:r>
-                            <a:rPr lang="en-US" sz="3600" i="1">
-                              <a:latin typeface="Cambria Math" panose="02040503050406030204" pitchFamily="18" charset="0"/>
-                            </a:rPr>
-                            <m:t>+1</m:t>
-                          </m:r>
-                        </m:e>
-                      </m:d>
-                      <m:r>
-                        <a:rPr lang="en-US" sz="3600" i="1">
-                          <a:latin typeface="Cambria Math" panose="02040503050406030204" pitchFamily="18" charset="0"/>
-                        </a:rPr>
-                        <m:t>=</m:t>
-                      </m:r>
-                      <m:nary>
-                        <m:naryPr>
-                          <m:limLoc m:val="undOvr"/>
-                          <m:ctrlPr>
-                            <a:rPr lang="en-US" sz="3600" i="1">
-                              <a:latin typeface="Cambria Math" panose="02040503050406030204" pitchFamily="18" charset="0"/>
-                            </a:rPr>
-                          </m:ctrlPr>
-                        </m:naryPr>
-                        <m:sub>
-                          <m:r>
-                            <m:rPr>
-                              <m:brk m:alnAt="24"/>
-                            </m:rPr>
-                            <a:rPr lang="en-US" sz="3600" i="1">
-                              <a:latin typeface="Cambria Math" panose="02040503050406030204" pitchFamily="18" charset="0"/>
-                            </a:rPr>
-                            <m:t>𝐿</m:t>
-                          </m:r>
-                        </m:sub>
-                        <m:sup>
-                          <m:r>
-                            <a:rPr lang="en-US" sz="3600" i="1">
-                              <a:latin typeface="Cambria Math" panose="02040503050406030204" pitchFamily="18" charset="0"/>
-                            </a:rPr>
-                            <m:t>𝑈</m:t>
-                          </m:r>
-                        </m:sup>
-                        <m:e>
-                          <m:r>
-                            <a:rPr lang="en-US" sz="3600" i="1">
-                              <a:latin typeface="Cambria Math" panose="02040503050406030204" pitchFamily="18" charset="0"/>
-                            </a:rPr>
-                            <m:t>[</m:t>
-                          </m:r>
-                          <m:r>
-                            <a:rPr lang="en-US" sz="3600" i="1">
-                              <a:latin typeface="Cambria Math" panose="02040503050406030204" pitchFamily="18" charset="0"/>
-                            </a:rPr>
-                            <m:t>𝑃</m:t>
-                          </m:r>
-                          <m:d>
-                            <m:dPr>
-                              <m:ctrlPr>
-                                <a:rPr lang="en-US" sz="3600" i="1">
-                                  <a:latin typeface="Cambria Math" panose="02040503050406030204" pitchFamily="18" charset="0"/>
-                                </a:rPr>
-                              </m:ctrlPr>
-                            </m:dPr>
-                            <m:e>
-                              <m:sSup>
-                                <m:sSupPr>
-                                  <m:ctrlPr>
-                                    <a:rPr lang="en-US" sz="3600" i="1">
-                                      <a:latin typeface="Cambria Math" panose="02040503050406030204" pitchFamily="18" charset="0"/>
-                                    </a:rPr>
-                                  </m:ctrlPr>
-                                </m:sSupPr>
-                                <m:e>
-                                  <m:r>
-                                    <a:rPr lang="en-US" sz="3600" i="1">
-                                      <a:latin typeface="Cambria Math" panose="02040503050406030204" pitchFamily="18" charset="0"/>
-                                    </a:rPr>
-                                    <m:t>𝑧</m:t>
-                                  </m:r>
-                                </m:e>
-                                <m:sup>
-                                  <m:r>
-                                    <a:rPr lang="en-US" sz="3600" i="1">
-                                      <a:latin typeface="Cambria Math" panose="02040503050406030204" pitchFamily="18" charset="0"/>
-                                    </a:rPr>
-                                    <m:t>′</m:t>
-                                  </m:r>
-                                </m:sup>
-                              </m:sSup>
-                              <m:r>
-                                <a:rPr lang="en-US" sz="3600" i="1">
-                                  <a:latin typeface="Cambria Math" panose="02040503050406030204" pitchFamily="18" charset="0"/>
-                                </a:rPr>
-                                <m:t>,</m:t>
-                              </m:r>
-                              <m:r>
-                                <a:rPr lang="en-US" sz="3600" i="1">
-                                  <a:latin typeface="Cambria Math" panose="02040503050406030204" pitchFamily="18" charset="0"/>
-                                </a:rPr>
-                                <m:t>𝑧</m:t>
-                              </m:r>
-                            </m:e>
-                          </m:d>
-                          <m:r>
-                            <a:rPr lang="en-US" sz="3600" i="1">
-                              <a:latin typeface="Cambria Math" panose="02040503050406030204" pitchFamily="18" charset="0"/>
-                            </a:rPr>
-                            <m:t>+</m:t>
-                          </m:r>
-                          <m:r>
-                            <a:rPr lang="en-US" sz="3600" i="1">
-                              <a:latin typeface="Cambria Math" panose="02040503050406030204" pitchFamily="18" charset="0"/>
-                            </a:rPr>
-                            <m:t>𝐹</m:t>
-                          </m:r>
-                          <m:d>
-                            <m:dPr>
-                              <m:ctrlPr>
-                                <a:rPr lang="en-US" sz="3600" i="1">
-                                  <a:latin typeface="Cambria Math" panose="02040503050406030204" pitchFamily="18" charset="0"/>
-                                </a:rPr>
-                              </m:ctrlPr>
-                            </m:dPr>
-                            <m:e>
-                              <m:sSup>
-                                <m:sSupPr>
-                                  <m:ctrlPr>
-                                    <a:rPr lang="en-US" sz="3600" i="1">
-                                      <a:latin typeface="Cambria Math" panose="02040503050406030204" pitchFamily="18" charset="0"/>
-                                    </a:rPr>
-                                  </m:ctrlPr>
-                                </m:sSupPr>
-                                <m:e>
-                                  <m:r>
-                                    <a:rPr lang="en-US" sz="3600" i="1">
-                                      <a:latin typeface="Cambria Math" panose="02040503050406030204" pitchFamily="18" charset="0"/>
-                                    </a:rPr>
-                                    <m:t>𝑧</m:t>
-                                  </m:r>
-                                </m:e>
-                                <m:sup>
-                                  <m:r>
-                                    <a:rPr lang="en-US" sz="3600" i="1">
-                                      <a:latin typeface="Cambria Math" panose="02040503050406030204" pitchFamily="18" charset="0"/>
-                                    </a:rPr>
-                                    <m:t>′</m:t>
-                                  </m:r>
-                                </m:sup>
-                              </m:sSup>
-                              <m:r>
-                                <a:rPr lang="en-US" sz="3600" i="1">
-                                  <a:latin typeface="Cambria Math" panose="02040503050406030204" pitchFamily="18" charset="0"/>
-                                </a:rPr>
-                                <m:t>,</m:t>
-                              </m:r>
-                              <m:r>
-                                <a:rPr lang="en-US" sz="3600" i="1">
-                                  <a:latin typeface="Cambria Math" panose="02040503050406030204" pitchFamily="18" charset="0"/>
-                                </a:rPr>
-                                <m:t>𝑧</m:t>
-                              </m:r>
-                            </m:e>
-                          </m:d>
-                          <m:r>
-                            <a:rPr lang="en-US" sz="3600" i="1">
-                              <a:latin typeface="Cambria Math" panose="02040503050406030204" pitchFamily="18" charset="0"/>
-                            </a:rPr>
-                            <m:t>]</m:t>
-                          </m:r>
-                          <m:r>
-                            <a:rPr lang="en-US" sz="3600" i="1">
-                              <a:latin typeface="Cambria Math" panose="02040503050406030204" pitchFamily="18" charset="0"/>
-                            </a:rPr>
-                            <m:t>𝑛</m:t>
-                          </m:r>
-                          <m:d>
-                            <m:dPr>
-                              <m:ctrlPr>
-                                <a:rPr lang="en-US" sz="3600" i="1">
-                                  <a:latin typeface="Cambria Math" panose="02040503050406030204" pitchFamily="18" charset="0"/>
-                                </a:rPr>
-                              </m:ctrlPr>
-                            </m:dPr>
-                            <m:e>
-                              <m:r>
-                                <a:rPr lang="en-US" sz="3600" i="1">
-                                  <a:latin typeface="Cambria Math" panose="02040503050406030204" pitchFamily="18" charset="0"/>
-                                </a:rPr>
-                                <m:t>𝑧</m:t>
-                              </m:r>
-                              <m:r>
-                                <a:rPr lang="en-US" sz="3600" i="1">
-                                  <a:latin typeface="Cambria Math" panose="02040503050406030204" pitchFamily="18" charset="0"/>
-                                </a:rPr>
-                                <m:t>,</m:t>
-                              </m:r>
-                              <m:r>
-                                <a:rPr lang="en-US" sz="3600" i="1">
-                                  <a:latin typeface="Cambria Math" panose="02040503050406030204" pitchFamily="18" charset="0"/>
-                                </a:rPr>
-                                <m:t>𝑡</m:t>
-                              </m:r>
-                            </m:e>
-                          </m:d>
-                          <m:r>
-                            <a:rPr lang="en-US" sz="3600" i="1">
-                              <a:latin typeface="Cambria Math" panose="02040503050406030204" pitchFamily="18" charset="0"/>
-                            </a:rPr>
-                            <m:t>𝑑𝑧</m:t>
-                          </m:r>
-                        </m:e>
-                      </m:nary>
-                    </m:oMath>
-                  </m:oMathPara>
-                </a14:m>
-                <a:endParaRPr lang="en-US" sz="3600" dirty="0"/>
-              </a:p>
-              <a:p>
-                <a:r>
-                  <a:rPr lang="en-US" sz="3600" i="1" dirty="0"/>
-                  <a:t>P(</a:t>
-                </a:r>
-                <a:r>
-                  <a:rPr lang="en-US" sz="3600" i="1" dirty="0" err="1"/>
-                  <a:t>z’,z</a:t>
-                </a:r>
-                <a:r>
-                  <a:rPr lang="en-US" sz="3600" i="1" dirty="0"/>
-                  <a:t>) = s(z) * G(</a:t>
-                </a:r>
-                <a:r>
-                  <a:rPr lang="en-US" sz="3600" i="1" dirty="0" err="1"/>
-                  <a:t>z’,z</a:t>
-                </a:r>
-                <a:r>
-                  <a:rPr lang="en-US" sz="3600" i="1" dirty="0"/>
-                  <a:t>)</a:t>
-                </a:r>
-              </a:p>
-              <a:p>
-                <a:r>
-                  <a:rPr lang="en-US" sz="3600" i="1" dirty="0"/>
-                  <a:t>G(</a:t>
-                </a:r>
-                <a:r>
-                  <a:rPr lang="en-US" sz="3600" i="1" dirty="0" err="1"/>
-                  <a:t>z’,z</a:t>
-                </a:r>
-                <a:r>
-                  <a:rPr lang="en-US" sz="3600" i="1" dirty="0"/>
-                  <a:t>) = </a:t>
-                </a:r>
-                <a:r>
-                  <a:rPr lang="en-US" sz="3600" i="1" dirty="0" err="1"/>
-                  <a:t>f</a:t>
-                </a:r>
-                <a:r>
-                  <a:rPr lang="en-US" sz="3600" i="1" baseline="-25000" dirty="0" err="1"/>
-                  <a:t>G</a:t>
-                </a:r>
-                <a:r>
-                  <a:rPr lang="en-US" sz="3600" i="1" dirty="0"/>
-                  <a:t>(z’|</a:t>
-                </a:r>
-                <a:r>
-                  <a:rPr lang="el-GR" sz="3600" i="1" dirty="0"/>
-                  <a:t>μ</a:t>
-                </a:r>
-                <a:r>
-                  <a:rPr lang="en-US" sz="3600" i="1" dirty="0"/>
-                  <a:t>(z), </a:t>
-                </a:r>
-                <a:r>
-                  <a:rPr lang="el-GR" sz="3600" i="1" dirty="0"/>
-                  <a:t>σ</a:t>
-                </a:r>
-                <a:r>
-                  <a:rPr lang="en-US" sz="3600" i="1" dirty="0"/>
-                  <a:t>)</a:t>
-                </a:r>
-              </a:p>
-              <a:p>
-                <a:r>
-                  <a:rPr lang="en-US" sz="3600" i="1" dirty="0"/>
-                  <a:t>Logit(s(z)) = a + b * z</a:t>
-                </a:r>
-                <a:endParaRPr lang="en-US" sz="3600" i="1" dirty="0"/>
-              </a:p>
-            </p:txBody>
-          </p:sp>
-        </mc:Choice>
-        <mc:Fallback>
-          <p:sp>
-            <p:nvSpPr>
-              <p:cNvPr id="32" name="TextBox 31"/>
-              <p:cNvSpPr txBox="1">
-                <a:spLocks noRot="1" noChangeAspect="1" noMove="1" noResize="1" noEditPoints="1" noAdjustHandles="1" noChangeArrowheads="1" noChangeShapeType="1" noTextEdit="1"/>
-              </p:cNvSpPr>
-              <p:nvPr/>
-            </p:nvSpPr>
-            <p:spPr>
-              <a:xfrm>
-                <a:off x="886644" y="206996"/>
-                <a:ext cx="9178547" cy="3420680"/>
-              </a:xfrm>
-              <a:prstGeom prst="rect">
-                <a:avLst/>
-              </a:prstGeom>
-              <a:blipFill>
-                <a:blip r:embed="rId2"/>
-                <a:stretch>
-                  <a:fillRect l="-1923" b="-5684"/>
-                </a:stretch>
-              </a:blipFill>
-            </p:spPr>
-            <p:txBody>
-              <a:bodyPr/>
-              <a:lstStyle/>
-              <a:p>
-                <a:r>
-                  <a:rPr lang="en-US">
-                    <a:noFill/>
-                  </a:rPr>
-                  <a:t> </a:t>
-                </a:r>
-              </a:p>
-            </p:txBody>
-          </p:sp>
-        </mc:Fallback>
-      </mc:AlternateContent>
-      <p:sp>
-        <p:nvSpPr>
-          <p:cNvPr id="34" name="TextBox 33"/>
-          <p:cNvSpPr txBox="1"/>
-          <p:nvPr/>
-        </p:nvSpPr>
-        <p:spPr>
-          <a:xfrm>
-            <a:off x="911646" y="3929067"/>
-            <a:ext cx="9178547" cy="1754326"/>
-          </a:xfrm>
-          <a:prstGeom prst="rect">
-            <a:avLst/>
-          </a:prstGeom>
-        </p:spPr>
-        <p:style>
-          <a:lnRef idx="2">
-            <a:schemeClr val="dk1"/>
-          </a:lnRef>
-          <a:fillRef idx="1">
-            <a:schemeClr val="lt1"/>
-          </a:fillRef>
-          <a:effectRef idx="0">
-            <a:schemeClr val="dk1"/>
-          </a:effectRef>
-          <a:fontRef idx="minor">
-            <a:schemeClr val="dk1"/>
-          </a:fontRef>
-        </p:style>
-        <p:txBody>
-          <a:bodyPr wrap="square" rtlCol="0">
-            <a:spAutoFit/>
-          </a:bodyPr>
-          <a:lstStyle/>
-          <a:p>
-            <a:r>
-              <a:rPr lang="en-US" sz="3600" i="1" dirty="0"/>
-              <a:t>P  = s* G</a:t>
-            </a:r>
-          </a:p>
-          <a:p>
-            <a:r>
-              <a:rPr lang="en-US" sz="3600" i="1" dirty="0"/>
-              <a:t>G = Norm(</a:t>
-            </a:r>
-            <a:r>
-              <a:rPr lang="en-US" sz="3600" i="1" dirty="0" err="1"/>
-              <a:t>mu_g</a:t>
-            </a:r>
-            <a:r>
-              <a:rPr lang="en-US" sz="3600" i="1" dirty="0"/>
-              <a:t>, </a:t>
-            </a:r>
-            <a:r>
-              <a:rPr lang="en-US" sz="3600" i="1" dirty="0" err="1"/>
-              <a:t>sigma_g</a:t>
-            </a:r>
-            <a:r>
-              <a:rPr lang="en-US" sz="3600" i="1" dirty="0"/>
-              <a:t>)</a:t>
-            </a:r>
-          </a:p>
-          <a:p>
-            <a:r>
-              <a:rPr lang="en-US" sz="3600" i="1" dirty="0"/>
-              <a:t>s  = 1 / (1 + </a:t>
-            </a:r>
-            <a:r>
-              <a:rPr lang="en-US" sz="3600" i="1" dirty="0" err="1"/>
-              <a:t>exp</a:t>
-            </a:r>
-            <a:r>
-              <a:rPr lang="en-US" sz="3600" i="1" dirty="0"/>
-              <a:t>(-(</a:t>
-            </a:r>
-            <a:r>
-              <a:rPr lang="en-US" sz="3600" i="1" dirty="0" err="1"/>
-              <a:t>a_s</a:t>
-            </a:r>
-            <a:r>
-              <a:rPr lang="en-US" sz="3600" i="1" dirty="0"/>
-              <a:t> + </a:t>
-            </a:r>
-            <a:r>
-              <a:rPr lang="en-US" sz="3600" i="1" dirty="0" err="1"/>
-              <a:t>b_s</a:t>
-            </a:r>
-            <a:r>
-              <a:rPr lang="en-US" sz="3600" i="1" dirty="0"/>
-              <a:t> * z_1)))</a:t>
-            </a:r>
-            <a:endParaRPr lang="en-US" sz="3600" i="1" dirty="0"/>
-          </a:p>
-        </p:txBody>
-      </p:sp>
-      <p:cxnSp>
-        <p:nvCxnSpPr>
-          <p:cNvPr id="36" name="Straight Arrow Connector 35"/>
-          <p:cNvCxnSpPr>
-            <a:stCxn id="32" idx="2"/>
-            <a:endCxn id="34" idx="0"/>
-          </p:cNvCxnSpPr>
-          <p:nvPr/>
-        </p:nvCxnSpPr>
-        <p:spPr>
-          <a:xfrm>
-            <a:off x="5475918" y="3627676"/>
-            <a:ext cx="25002" cy="301391"/>
-          </a:xfrm>
-          <a:prstGeom prst="straightConnector1">
-            <a:avLst/>
-          </a:prstGeom>
-          <a:ln>
-            <a:tailEnd type="triangle"/>
-          </a:ln>
-        </p:spPr>
-        <p:style>
-          <a:lnRef idx="3">
-            <a:schemeClr val="dk1"/>
-          </a:lnRef>
-          <a:fillRef idx="0">
-            <a:schemeClr val="dk1"/>
-          </a:fillRef>
-          <a:effectRef idx="2">
-            <a:schemeClr val="dk1"/>
-          </a:effectRef>
-          <a:fontRef idx="minor">
-            <a:schemeClr val="tx1"/>
-          </a:fontRef>
-        </p:style>
-      </p:cxnSp>
-      <p:cxnSp>
-        <p:nvCxnSpPr>
-          <p:cNvPr id="39" name="Straight Arrow Connector 38"/>
-          <p:cNvCxnSpPr>
-            <a:endCxn id="5" idx="0"/>
-          </p:cNvCxnSpPr>
-          <p:nvPr/>
-        </p:nvCxnSpPr>
-        <p:spPr>
-          <a:xfrm>
-            <a:off x="16402996" y="6714730"/>
-            <a:ext cx="1" cy="871482"/>
-          </a:xfrm>
-          <a:prstGeom prst="straightConnector1">
-            <a:avLst/>
-          </a:prstGeom>
-          <a:ln>
-            <a:tailEnd type="triangle"/>
-          </a:ln>
-        </p:spPr>
-        <p:style>
-          <a:lnRef idx="3">
-            <a:schemeClr val="dk1"/>
-          </a:lnRef>
-          <a:fillRef idx="0">
-            <a:schemeClr val="dk1"/>
-          </a:fillRef>
-          <a:effectRef idx="2">
-            <a:schemeClr val="dk1"/>
-          </a:effectRef>
-          <a:fontRef idx="minor">
-            <a:schemeClr val="tx1"/>
-          </a:fontRef>
-        </p:style>
-      </p:cxnSp>
-      <p:sp>
-        <p:nvSpPr>
-          <p:cNvPr id="41" name="TextBox 40"/>
-          <p:cNvSpPr txBox="1"/>
-          <p:nvPr/>
-        </p:nvSpPr>
-        <p:spPr>
-          <a:xfrm>
-            <a:off x="886643" y="7586212"/>
-            <a:ext cx="9203549" cy="3416320"/>
-          </a:xfrm>
-          <a:prstGeom prst="rect">
-            <a:avLst/>
-          </a:prstGeom>
-        </p:spPr>
-        <p:style>
-          <a:lnRef idx="2">
-            <a:schemeClr val="dk1"/>
-          </a:lnRef>
-          <a:fillRef idx="1">
-            <a:schemeClr val="lt1"/>
-          </a:fillRef>
-          <a:effectRef idx="0">
-            <a:schemeClr val="dk1"/>
-          </a:effectRef>
-          <a:fontRef idx="minor">
-            <a:schemeClr val="dk1"/>
-          </a:fontRef>
-        </p:style>
-        <p:txBody>
-          <a:bodyPr wrap="square" rtlCol="0">
-            <a:spAutoFit/>
-          </a:bodyPr>
-          <a:lstStyle/>
-          <a:p>
-            <a:r>
-              <a:rPr lang="en-US" sz="3600" i="1" dirty="0" err="1"/>
-              <a:t>define_kernel</a:t>
-            </a:r>
-            <a:r>
-              <a:rPr lang="en-US" sz="3600" i="1" dirty="0"/>
-              <a:t>(</a:t>
-            </a:r>
-          </a:p>
-          <a:p>
-            <a:r>
-              <a:rPr lang="en-US" sz="3600" i="1" dirty="0"/>
-              <a:t>“P”,</a:t>
-            </a:r>
-          </a:p>
-          <a:p>
-            <a:r>
-              <a:rPr lang="en-US" sz="3600" i="1" dirty="0"/>
-              <a:t>P = s * G</a:t>
-            </a:r>
-          </a:p>
-          <a:p>
-            <a:r>
-              <a:rPr lang="en-US" sz="3600" i="1" dirty="0"/>
-              <a:t>G = </a:t>
-            </a:r>
-            <a:r>
-              <a:rPr lang="en-US" sz="3600" i="1" dirty="0" err="1"/>
-              <a:t>dnorm</a:t>
-            </a:r>
-            <a:r>
-              <a:rPr lang="en-US" sz="3600" i="1" dirty="0"/>
-              <a:t>(z_2, </a:t>
-            </a:r>
-            <a:r>
-              <a:rPr lang="en-US" sz="3600" i="1" dirty="0" err="1"/>
-              <a:t>mu_g</a:t>
-            </a:r>
-            <a:r>
-              <a:rPr lang="en-US" sz="3600" i="1" dirty="0"/>
-              <a:t>, </a:t>
-            </a:r>
-            <a:r>
-              <a:rPr lang="en-US" sz="3600" i="1" dirty="0" err="1"/>
-              <a:t>sigma_g</a:t>
-            </a:r>
-            <a:r>
-              <a:rPr lang="en-US" sz="3600" i="1" dirty="0"/>
-              <a:t>)</a:t>
-            </a:r>
-          </a:p>
-          <a:p>
-            <a:r>
-              <a:rPr lang="en-US" sz="3600" i="1" dirty="0"/>
-              <a:t>S = 1 / (1 + </a:t>
-            </a:r>
-            <a:r>
-              <a:rPr lang="en-US" sz="3600" i="1" dirty="0" err="1"/>
-              <a:t>exp</a:t>
-            </a:r>
-            <a:r>
-              <a:rPr lang="en-US" sz="3600" i="1" dirty="0"/>
-              <a:t>(-(</a:t>
-            </a:r>
-            <a:r>
-              <a:rPr lang="en-US" sz="3600" i="1" dirty="0" err="1"/>
-              <a:t>a_s</a:t>
-            </a:r>
-            <a:r>
-              <a:rPr lang="en-US" sz="3600" i="1" dirty="0"/>
-              <a:t>  + </a:t>
-            </a:r>
-            <a:r>
-              <a:rPr lang="en-US" sz="3600" i="1" dirty="0" err="1"/>
-              <a:t>b_s</a:t>
-            </a:r>
-            <a:r>
-              <a:rPr lang="en-US" sz="3600" i="1" dirty="0"/>
-              <a:t> * z_1))),</a:t>
-            </a:r>
-          </a:p>
-          <a:p>
-            <a:r>
-              <a:rPr lang="en-US" sz="3600" i="1" dirty="0" err="1"/>
-              <a:t>d</a:t>
-            </a:r>
-            <a:r>
-              <a:rPr lang="en-US" sz="3600" i="1" dirty="0" err="1"/>
-              <a:t>ata_list</a:t>
-            </a:r>
-            <a:r>
-              <a:rPr lang="en-US" sz="3600" i="1" dirty="0"/>
-              <a:t> = </a:t>
-            </a:r>
-            <a:r>
-              <a:rPr lang="en-US" sz="3600" i="1" dirty="0" err="1"/>
-              <a:t>parameter_list</a:t>
-            </a:r>
-            <a:r>
-              <a:rPr lang="en-US" sz="3600" i="1" dirty="0"/>
-              <a:t>)</a:t>
-            </a:r>
-            <a:endParaRPr lang="en-US" sz="3600" i="1" dirty="0"/>
-          </a:p>
-        </p:txBody>
-      </p:sp>
-      <p:cxnSp>
-        <p:nvCxnSpPr>
-          <p:cNvPr id="42" name="Straight Arrow Connector 41"/>
-          <p:cNvCxnSpPr>
-            <a:stCxn id="34" idx="2"/>
-          </p:cNvCxnSpPr>
-          <p:nvPr/>
-        </p:nvCxnSpPr>
-        <p:spPr>
-          <a:xfrm flipH="1">
-            <a:off x="5475916" y="5683393"/>
-            <a:ext cx="25004" cy="1902820"/>
-          </a:xfrm>
-          <a:prstGeom prst="straightConnector1">
-            <a:avLst/>
-          </a:prstGeom>
-          <a:ln>
-            <a:tailEnd type="triangle"/>
-          </a:ln>
-        </p:spPr>
-        <p:style>
-          <a:lnRef idx="3">
-            <a:schemeClr val="dk1"/>
-          </a:lnRef>
-          <a:fillRef idx="0">
-            <a:schemeClr val="dk1"/>
-          </a:fillRef>
-          <a:effectRef idx="2">
-            <a:schemeClr val="dk1"/>
-          </a:effectRef>
-          <a:fontRef idx="minor">
-            <a:schemeClr val="tx1"/>
-          </a:fontRef>
-        </p:style>
-      </p:cxnSp>
-      <p:sp>
-        <p:nvSpPr>
-          <p:cNvPr id="44" name="TextBox 43"/>
-          <p:cNvSpPr txBox="1"/>
-          <p:nvPr/>
-        </p:nvSpPr>
-        <p:spPr>
-          <a:xfrm>
-            <a:off x="886643" y="12447545"/>
-            <a:ext cx="9203549" cy="2308324"/>
-          </a:xfrm>
-          <a:prstGeom prst="rect">
-            <a:avLst/>
-          </a:prstGeom>
-        </p:spPr>
-        <p:style>
-          <a:lnRef idx="2">
-            <a:schemeClr val="dk1"/>
-          </a:lnRef>
-          <a:fillRef idx="1">
-            <a:schemeClr val="lt1"/>
-          </a:fillRef>
-          <a:effectRef idx="0">
-            <a:schemeClr val="dk1"/>
-          </a:effectRef>
-          <a:fontRef idx="minor">
-            <a:schemeClr val="dk1"/>
-          </a:fontRef>
-        </p:style>
-        <p:txBody>
-          <a:bodyPr wrap="square" rtlCol="0">
-            <a:spAutoFit/>
-          </a:bodyPr>
-          <a:lstStyle/>
-          <a:p>
-            <a:r>
-              <a:rPr lang="en-US" sz="3600" i="1"/>
-              <a:t>lambda</a:t>
-            </a:r>
-            <a:r>
-              <a:rPr lang="en-US" sz="3600" i="1" dirty="0"/>
-              <a:t>(), </a:t>
-            </a:r>
-            <a:r>
-              <a:rPr lang="en-US" sz="3600" i="1" dirty="0" err="1"/>
-              <a:t>right_ev</a:t>
-            </a:r>
-            <a:r>
-              <a:rPr lang="en-US" sz="3600" i="1" dirty="0"/>
-              <a:t>(), </a:t>
-            </a:r>
-            <a:r>
-              <a:rPr lang="en-US" sz="3600" i="1" dirty="0" err="1"/>
-              <a:t>left_ev</a:t>
-            </a:r>
-            <a:r>
-              <a:rPr lang="en-US" sz="3600" i="1" dirty="0"/>
-              <a:t>(), </a:t>
-            </a:r>
-            <a:r>
-              <a:rPr lang="en-US" sz="3600" i="1" dirty="0" err="1"/>
-              <a:t>make_iter_kernel</a:t>
-            </a:r>
-            <a:r>
-              <a:rPr lang="en-US" sz="3600" i="1" dirty="0"/>
-              <a:t>(), </a:t>
-            </a:r>
-            <a:r>
-              <a:rPr lang="en-US" sz="3600" i="1" dirty="0" err="1"/>
-              <a:t>mean_kernel</a:t>
-            </a:r>
-            <a:r>
-              <a:rPr lang="en-US" sz="3600" i="1" dirty="0"/>
-              <a:t>(), </a:t>
-            </a:r>
-            <a:r>
-              <a:rPr lang="en-US" sz="3600" dirty="0"/>
-              <a:t>other packages</a:t>
-            </a:r>
-            <a:endParaRPr lang="en-US" sz="3600" i="1" dirty="0"/>
-          </a:p>
-          <a:p>
-            <a:endParaRPr lang="en-US" sz="3600" dirty="0"/>
-          </a:p>
-        </p:txBody>
-      </p:sp>
-      <p:cxnSp>
-        <p:nvCxnSpPr>
-          <p:cNvPr id="45" name="Straight Arrow Connector 44"/>
-          <p:cNvCxnSpPr>
-            <a:stCxn id="41" idx="2"/>
-            <a:endCxn id="44" idx="0"/>
-          </p:cNvCxnSpPr>
-          <p:nvPr/>
-        </p:nvCxnSpPr>
-        <p:spPr>
-          <a:xfrm>
-            <a:off x="5488418" y="11002532"/>
-            <a:ext cx="0" cy="1445013"/>
-          </a:xfrm>
-          <a:prstGeom prst="straightConnector1">
-            <a:avLst/>
-          </a:prstGeom>
-          <a:ln>
-            <a:tailEnd type="triangle"/>
-          </a:ln>
-        </p:spPr>
-        <p:style>
-          <a:lnRef idx="3">
-            <a:schemeClr val="dk1"/>
-          </a:lnRef>
-          <a:fillRef idx="0">
-            <a:schemeClr val="dk1"/>
-          </a:fillRef>
-          <a:effectRef idx="2">
-            <a:schemeClr val="dk1"/>
-          </a:effectRef>
-          <a:fontRef idx="minor">
-            <a:schemeClr val="tx1"/>
-          </a:fontRef>
-        </p:style>
-      </p:cxnSp>
+            <a:endParaRPr lang="en-US" sz="4800"/>
+          </a:p>
+        </p:txBody>
+      </p:sp>
     </p:spTree>
     <p:extLst>
       <p:ext uri="{BB962C8B-B14F-4D97-AF65-F5344CB8AC3E}">

</xml_diff>